<commit_message>
14 added sensor to check when the load balancer is available in AWS
</commit_message>
<xml_diff>
--- a/java-cro-presentation.pptx
+++ b/java-cro-presentation.pptx
@@ -9,8 +9,8 @@
   </p:notesMasterIdLst>
   <p:sldIdLst>
     <p:sldId id="256" r:id="rId2"/>
-    <p:sldId id="257" r:id="rId3"/>
-    <p:sldId id="259" r:id="rId4"/>
+    <p:sldId id="259" r:id="rId3"/>
+    <p:sldId id="257" r:id="rId4"/>
     <p:sldId id="267" r:id="rId5"/>
     <p:sldId id="260" r:id="rId6"/>
     <p:sldId id="269" r:id="rId7"/>
@@ -524,7 +524,16 @@
           <a:bodyPr/>
           <a:lstStyle/>
           <a:p>
-            <a:endParaRPr lang="en-US" dirty="0"/>
+            <a:r>
+              <a:rPr lang="en-US" dirty="0"/>
+              <a:t>Good morning! I am surprised to have an audience after last night’s debauchery. I am honestly surprised I made it. </a:t>
+            </a:r>
+          </a:p>
+          <a:p>
+            <a:r>
+              <a:rPr lang="en-US" dirty="0"/>
+              <a:t>But since we are all here, let me entertain you the next 45 minutes with who I am, what I do and to introduce you to some interesting ways of working with/on (?) the cloud, or pretend to, until you have no choice. </a:t>
+            </a:r>
           </a:p>
         </p:txBody>
       </p:sp>
@@ -545,7 +554,7 @@
           <a:p>
             <a:fld id="{D62F27D6-02B0-9E4F-9688-CC4BB499F553}" type="slidenum">
               <a:rPr lang="en-US" smtClean="0"/>
-              <a:t>2</a:t>
+              <a:t>1</a:t>
             </a:fld>
             <a:endParaRPr lang="en-US"/>
           </a:p>
@@ -554,7 +563,7 @@
     </p:spTree>
     <p:extLst>
       <p:ext uri="{BB962C8B-B14F-4D97-AF65-F5344CB8AC3E}">
-        <p14:creationId xmlns:p14="http://schemas.microsoft.com/office/powerpoint/2010/main" val="1213932907"/>
+        <p14:creationId xmlns:p14="http://schemas.microsoft.com/office/powerpoint/2010/main" val="4258739524"/>
       </p:ext>
     </p:extLst>
   </p:cSld>
@@ -621,36 +630,6 @@
               <a:t> because this is the hype right now, and I have to write about it in my latest book.  </a:t>
             </a:r>
           </a:p>
-          <a:p>
-            <a:r>
-              <a:rPr lang="en-US" dirty="0"/>
-              <a:t>Well.. Not all worked as expected, as you will see – because I need different images for EKS, since I have a mac with Silicone M1 chip. </a:t>
-            </a:r>
-          </a:p>
-          <a:p>
-            <a:r>
-              <a:rPr lang="en-US" dirty="0"/>
-              <a:t>After demo, use text comparator to compare the types -&gt; show that there are barely any differences</a:t>
-            </a:r>
-          </a:p>
-          <a:p>
-            <a:endParaRPr lang="en-US" dirty="0"/>
-          </a:p>
-          <a:p>
-            <a:r>
-              <a:rPr lang="en-US" dirty="0"/>
-              <a:t>On EKS we also need ECR to load our Docker images</a:t>
-            </a:r>
-          </a:p>
-          <a:p>
-            <a:endParaRPr lang="en-US" dirty="0"/>
-          </a:p>
-          <a:p>
-            <a:r>
-              <a:rPr lang="en-US" dirty="0"/>
-              <a:t>And because we are Scottish, we don’t have a progress bar, or a pie chart, we have a kilt diagram</a:t>
-            </a:r>
-          </a:p>
         </p:txBody>
       </p:sp>
       <p:sp>
@@ -670,7 +649,7 @@
           <a:p>
             <a:fld id="{D62F27D6-02B0-9E4F-9688-CC4BB499F553}" type="slidenum">
               <a:rPr lang="en-US" smtClean="0"/>
-              <a:t>13</a:t>
+              <a:t>12</a:t>
             </a:fld>
             <a:endParaRPr lang="en-US"/>
           </a:p>
@@ -679,7 +658,7 @@
     </p:spTree>
     <p:extLst>
       <p:ext uri="{BB962C8B-B14F-4D97-AF65-F5344CB8AC3E}">
-        <p14:creationId xmlns:p14="http://schemas.microsoft.com/office/powerpoint/2010/main" val="3853619628"/>
+        <p14:creationId xmlns:p14="http://schemas.microsoft.com/office/powerpoint/2010/main" val="1957204630"/>
       </p:ext>
     </p:extLst>
   </p:cSld>
@@ -733,26 +712,29 @@
           <a:bodyPr/>
           <a:lstStyle/>
           <a:p>
-            <a:pPr marL="0" marR="0" lvl="0" indent="0" algn="l" defTabSz="914400" rtl="0" eaLnBrk="1" fontAlgn="auto" latinLnBrk="0" hangingPunct="1">
-              <a:lnSpc>
-                <a:spcPct val="100000"/>
-              </a:lnSpc>
-              <a:spcBef>
-                <a:spcPts val="0"/>
-              </a:spcBef>
-              <a:spcAft>
-                <a:spcPts val="0"/>
-              </a:spcAft>
-              <a:buClrTx/>
-              <a:buSzTx/>
-              <a:buFontTx/>
-              <a:buNone/>
-              <a:tabLst/>
-              <a:defRPr/>
-            </a:pPr>
             <a:r>
               <a:rPr lang="en-US" dirty="0"/>
-              <a:t>Working in the cloud is like driving a car – you do not need to know what individual parts are made of, most time you do  not even have to know how they work together, but you do have to customize a few details, right? You have to adjust mirrors, the chair, the air conditioning and the music. </a:t>
+              <a:t>Yes, I added a native Spring Boot App, running on </a:t>
+            </a:r>
+            <a:r>
+              <a:rPr lang="en-US" dirty="0" err="1"/>
+              <a:t>GraalVM</a:t>
+            </a:r>
+            <a:r>
+              <a:rPr lang="en-US" dirty="0"/>
+              <a:t> because this is the hype right now, and I have to write about it in my latest book.  </a:t>
+            </a:r>
+          </a:p>
+          <a:p>
+            <a:r>
+              <a:rPr lang="en-US" dirty="0"/>
+              <a:t>Well.. Not all worked as expected, as you will see – because I need different images for EKS, since I have a mac with Silicone M1 chip. </a:t>
+            </a:r>
+          </a:p>
+          <a:p>
+            <a:r>
+              <a:rPr lang="en-US" dirty="0"/>
+              <a:t>After demo, use text comparator to compare the types -&gt; show that there are barely any differences</a:t>
             </a:r>
           </a:p>
           <a:p>
@@ -761,38 +743,17 @@
           <a:p>
             <a:r>
               <a:rPr lang="en-US" dirty="0"/>
-              <a:t>It depends </a:t>
-            </a:r>
-          </a:p>
-          <a:p>
-            <a:pPr marL="171450" indent="-171450">
-              <a:buFontTx/>
-              <a:buChar char="-"/>
-            </a:pPr>
+              <a:t>On EKS we also need ECR to load our Docker images</a:t>
+            </a:r>
+          </a:p>
+          <a:p>
+            <a:endParaRPr lang="en-US" dirty="0"/>
+          </a:p>
+          <a:p>
             <a:r>
               <a:rPr lang="en-US" dirty="0"/>
-              <a:t>Obviously if you are developing on a computer with a different architecture, you need to build different Docker images. </a:t>
-            </a:r>
-          </a:p>
-          <a:p>
-            <a:pPr marL="171450" indent="-171450">
-              <a:buFontTx/>
-              <a:buChar char="-"/>
-            </a:pPr>
-            <a:r>
-              <a:rPr lang="en-US" dirty="0"/>
-              <a:t>On your local you are not worries with details such as domains and public access, when deploying to the cloud you have to take care of these, and might require additional configuration.</a:t>
-            </a:r>
-          </a:p>
-          <a:p>
-            <a:pPr marL="171450" indent="-171450">
-              <a:buFontTx/>
-              <a:buChar char="-"/>
-            </a:pPr>
-            <a:endParaRPr lang="en-US" dirty="0"/>
-          </a:p>
-          <a:p>
-            <a:endParaRPr lang="en-US" dirty="0"/>
+              <a:t>And because we are Scottish, we don’t have a progress bar, or a pie chart, we have a kilt diagram</a:t>
+            </a:r>
           </a:p>
         </p:txBody>
       </p:sp>
@@ -813,7 +774,7 @@
           <a:p>
             <a:fld id="{D62F27D6-02B0-9E4F-9688-CC4BB499F553}" type="slidenum">
               <a:rPr lang="en-US" smtClean="0"/>
-              <a:t>14</a:t>
+              <a:t>13</a:t>
             </a:fld>
             <a:endParaRPr lang="en-US"/>
           </a:p>
@@ -822,7 +783,7 @@
     </p:spTree>
     <p:extLst>
       <p:ext uri="{BB962C8B-B14F-4D97-AF65-F5344CB8AC3E}">
-        <p14:creationId xmlns:p14="http://schemas.microsoft.com/office/powerpoint/2010/main" val="3534899792"/>
+        <p14:creationId xmlns:p14="http://schemas.microsoft.com/office/powerpoint/2010/main" val="3853619628"/>
       </p:ext>
     </p:extLst>
   </p:cSld>
@@ -901,6 +862,42 @@
           <a:p>
             <a:endParaRPr lang="en-US" dirty="0"/>
           </a:p>
+          <a:p>
+            <a:r>
+              <a:rPr lang="en-US" dirty="0"/>
+              <a:t>It depends </a:t>
+            </a:r>
+          </a:p>
+          <a:p>
+            <a:pPr marL="171450" indent="-171450">
+              <a:buFontTx/>
+              <a:buChar char="-"/>
+            </a:pPr>
+            <a:r>
+              <a:rPr lang="en-US" dirty="0"/>
+              <a:t>Obviously if you are developing on a computer with a different architecture, you need to build different Docker images. </a:t>
+            </a:r>
+          </a:p>
+          <a:p>
+            <a:pPr marL="171450" indent="-171450">
+              <a:buFontTx/>
+              <a:buChar char="-"/>
+            </a:pPr>
+            <a:r>
+              <a:rPr lang="en-US" dirty="0"/>
+              <a:t>On your local you are not worries with details such as domains and public access, when deploying to the cloud you have to take care of these, and might require additional configuration.</a:t>
+            </a:r>
+          </a:p>
+          <a:p>
+            <a:pPr marL="171450" indent="-171450">
+              <a:buFontTx/>
+              <a:buChar char="-"/>
+            </a:pPr>
+            <a:endParaRPr lang="en-US" dirty="0"/>
+          </a:p>
+          <a:p>
+            <a:endParaRPr lang="en-US" dirty="0"/>
+          </a:p>
         </p:txBody>
       </p:sp>
       <p:sp>
@@ -920,6 +917,113 @@
           <a:p>
             <a:fld id="{D62F27D6-02B0-9E4F-9688-CC4BB499F553}" type="slidenum">
               <a:rPr lang="en-US" smtClean="0"/>
+              <a:t>14</a:t>
+            </a:fld>
+            <a:endParaRPr lang="en-US"/>
+          </a:p>
+        </p:txBody>
+      </p:sp>
+    </p:spTree>
+    <p:extLst>
+      <p:ext uri="{BB962C8B-B14F-4D97-AF65-F5344CB8AC3E}">
+        <p14:creationId xmlns:p14="http://schemas.microsoft.com/office/powerpoint/2010/main" val="3534899792"/>
+      </p:ext>
+    </p:extLst>
+  </p:cSld>
+  <p:clrMapOvr>
+    <a:masterClrMapping/>
+  </p:clrMapOvr>
+</p:notes>
+</file>
+
+<file path=ppt/notesSlides/notesSlide13.xml><?xml version="1.0" encoding="utf-8"?>
+<p:notes xmlns:a="http://schemas.openxmlformats.org/drawingml/2006/main" xmlns:r="http://schemas.openxmlformats.org/officeDocument/2006/relationships" xmlns:p="http://schemas.openxmlformats.org/presentationml/2006/main">
+  <p:cSld>
+    <p:spTree>
+      <p:nvGrpSpPr>
+        <p:cNvPr id="1" name=""/>
+        <p:cNvGrpSpPr/>
+        <p:nvPr/>
+      </p:nvGrpSpPr>
+      <p:grpSpPr>
+        <a:xfrm>
+          <a:off x="0" y="0"/>
+          <a:ext cx="0" cy="0"/>
+          <a:chOff x="0" y="0"/>
+          <a:chExt cx="0" cy="0"/>
+        </a:xfrm>
+      </p:grpSpPr>
+      <p:sp>
+        <p:nvSpPr>
+          <p:cNvPr id="2" name="Slide Image Placeholder 1"/>
+          <p:cNvSpPr>
+            <a:spLocks noGrp="1" noRot="1" noChangeAspect="1"/>
+          </p:cNvSpPr>
+          <p:nvPr>
+            <p:ph type="sldImg"/>
+          </p:nvPr>
+        </p:nvSpPr>
+        <p:spPr/>
+      </p:sp>
+      <p:sp>
+        <p:nvSpPr>
+          <p:cNvPr id="3" name="Notes Placeholder 2"/>
+          <p:cNvSpPr>
+            <a:spLocks noGrp="1"/>
+          </p:cNvSpPr>
+          <p:nvPr>
+            <p:ph type="body" idx="1"/>
+          </p:nvPr>
+        </p:nvSpPr>
+        <p:spPr/>
+        <p:txBody>
+          <a:bodyPr/>
+          <a:lstStyle/>
+          <a:p>
+            <a:pPr marL="0" marR="0" lvl="0" indent="0" algn="l" defTabSz="914400" rtl="0" eaLnBrk="1" fontAlgn="auto" latinLnBrk="0" hangingPunct="1">
+              <a:lnSpc>
+                <a:spcPct val="100000"/>
+              </a:lnSpc>
+              <a:spcBef>
+                <a:spcPts val="0"/>
+              </a:spcBef>
+              <a:spcAft>
+                <a:spcPts val="0"/>
+              </a:spcAft>
+              <a:buClrTx/>
+              <a:buSzTx/>
+              <a:buFontTx/>
+              <a:buNone/>
+              <a:tabLst/>
+              <a:defRPr/>
+            </a:pPr>
+            <a:r>
+              <a:rPr lang="en-US" dirty="0"/>
+              <a:t>Working in the cloud is like driving a car – you do not need to know what individual parts are made of, most time you do  not even have to know how they work together, but you do have to customize a few details, right? You have to adjust mirrors, the chair, the air conditioning and the music. </a:t>
+            </a:r>
+          </a:p>
+          <a:p>
+            <a:endParaRPr lang="en-US" dirty="0"/>
+          </a:p>
+        </p:txBody>
+      </p:sp>
+      <p:sp>
+        <p:nvSpPr>
+          <p:cNvPr id="4" name="Slide Number Placeholder 3"/>
+          <p:cNvSpPr>
+            <a:spLocks noGrp="1"/>
+          </p:cNvSpPr>
+          <p:nvPr>
+            <p:ph type="sldNum" sz="quarter" idx="5"/>
+          </p:nvPr>
+        </p:nvSpPr>
+        <p:spPr/>
+        <p:txBody>
+          <a:bodyPr/>
+          <a:lstStyle/>
+          <a:p>
+            <a:fld id="{D62F27D6-02B0-9E4F-9688-CC4BB499F553}" type="slidenum">
+              <a:rPr lang="en-US" smtClean="0"/>
               <a:t>15</a:t>
             </a:fld>
             <a:endParaRPr lang="en-US"/>
@@ -939,7 +1043,7 @@
 </p:notes>
 </file>
 
-<file path=ppt/notesSlides/notesSlide13.xml><?xml version="1.0" encoding="utf-8"?>
+<file path=ppt/notesSlides/notesSlide14.xml><?xml version="1.0" encoding="utf-8"?>
 <p:notes xmlns:a="http://schemas.openxmlformats.org/drawingml/2006/main" xmlns:r="http://schemas.openxmlformats.org/officeDocument/2006/relationships" xmlns:p="http://schemas.openxmlformats.org/presentationml/2006/main">
   <p:cSld>
     <p:spTree>
@@ -1069,22 +1173,19 @@
           <a:p>
             <a:r>
               <a:rPr lang="en-US" dirty="0"/>
-              <a:t>There is this trend nowadays where people jump directly to technical stuff and introduce themselves at the end of a presentation. I prefer to keep it classic and introduce myself at the beginning.  </a:t>
-            </a:r>
+              <a:t>Before diving into the technical stuff, any of you here are familiar with my work, my face? Any of you has bought my books?</a:t>
+            </a:r>
+          </a:p>
+          <a:p>
+            <a:endParaRPr lang="en-US" dirty="0"/>
+          </a:p>
+          <a:p>
+            <a:endParaRPr lang="en-US" dirty="0"/>
           </a:p>
           <a:p>
             <a:r>
               <a:rPr lang="en-US" dirty="0"/>
-              <a:t>Let’s be honest, a 45 minutes presentation is not going to properly cover any subject related to working in the cloud. The best I can give you is the means to remember me and keep an eye on my online activity and books I write. So, I will give myself a few minutes to impress you with my technical prowess. </a:t>
-            </a:r>
-          </a:p>
-          <a:p>
-            <a:endParaRPr lang="en-US" dirty="0"/>
-          </a:p>
-          <a:p>
-            <a:r>
-              <a:rPr lang="en-US" dirty="0"/>
-              <a:t>I am Romanian, born, raised and educated and I live in Scotland. </a:t>
+              <a:t>I am Romanian, born, raised and educated and I reside in Scotland. </a:t>
             </a:r>
           </a:p>
           <a:p>
@@ -1209,26 +1310,15 @@
             <a:endParaRPr lang="en-US" dirty="0"/>
           </a:p>
           <a:p>
-            <a:pPr marL="0" marR="0" lvl="0" indent="0" algn="l" defTabSz="914400" rtl="0" eaLnBrk="1" fontAlgn="auto" latinLnBrk="0" hangingPunct="1">
-              <a:lnSpc>
-                <a:spcPct val="100000"/>
-              </a:lnSpc>
-              <a:spcBef>
-                <a:spcPts val="0"/>
-              </a:spcBef>
-              <a:spcAft>
-                <a:spcPts val="0"/>
-              </a:spcAft>
-              <a:buClrTx/>
-              <a:buSzTx/>
-              <a:buFontTx/>
-              <a:buNone/>
-              <a:tabLst/>
-              <a:defRPr/>
-            </a:pPr>
             <a:r>
               <a:rPr lang="en-US" dirty="0"/>
-              <a:t>What is the biggest </a:t>
+              <a:t>In all honesty, a 45 minutes presentation is not going to properly cover any subject related to working in the cloud. The best I can give you is the means to remember me and keep an eye on my online activity and books I write.</a:t>
+            </a:r>
+          </a:p>
+          <a:p>
+            <a:r>
+              <a:rPr lang="en-US" dirty="0"/>
+              <a:t> So, I will give myself a few minutes to impress you with my technical prowess and achievements</a:t>
             </a:r>
           </a:p>
           <a:p>
@@ -1302,7 +1392,7 @@
             </a:r>
             <a:r>
               <a:rPr lang="en-US" dirty="0"/>
-              <a:t> also has a department for that. It’s like learning to drive a car, but you to still consult a driving instructor from time to tome to avoid gas costs from bankrupting you, and avoid accidents. </a:t>
+              <a:t> also has a department for that. It’s like learning to drive a car, but you to still consult a driving instructor from time to time to avoid gas costs from bankrupting you, and avoid accidents. </a:t>
             </a:r>
           </a:p>
           <a:p>
@@ -1326,69 +1416,6 @@
             <a:endParaRPr lang="en-US" dirty="0"/>
           </a:p>
           <a:p>
-            <a:pPr marL="0" marR="0" lvl="0" indent="0" algn="l" defTabSz="914400" rtl="0" eaLnBrk="1" fontAlgn="auto" latinLnBrk="0" hangingPunct="1">
-              <a:lnSpc>
-                <a:spcPct val="100000"/>
-              </a:lnSpc>
-              <a:spcBef>
-                <a:spcPts val="0"/>
-              </a:spcBef>
-              <a:spcAft>
-                <a:spcPts val="0"/>
-              </a:spcAft>
-              <a:buClrTx/>
-              <a:buSzTx/>
-              <a:buFontTx/>
-              <a:buNone/>
-              <a:tabLst/>
-              <a:defRPr/>
-            </a:pPr>
-            <a:r>
-              <a:rPr lang="en-US" dirty="0"/>
-              <a:t>Yes, this presentation will (probably )contain a lot of car and driving analogies. </a:t>
-            </a:r>
-          </a:p>
-          <a:p>
-            <a:pPr marL="0" marR="0" lvl="0" indent="0" algn="l" defTabSz="914400" rtl="0" eaLnBrk="1" fontAlgn="auto" latinLnBrk="0" hangingPunct="1">
-              <a:lnSpc>
-                <a:spcPct val="100000"/>
-              </a:lnSpc>
-              <a:spcBef>
-                <a:spcPts val="0"/>
-              </a:spcBef>
-              <a:spcAft>
-                <a:spcPts val="0"/>
-              </a:spcAft>
-              <a:buClrTx/>
-              <a:buSzTx/>
-              <a:buFontTx/>
-              <a:buNone/>
-              <a:tabLst/>
-              <a:defRPr/>
-            </a:pPr>
-            <a:endParaRPr lang="en-US" dirty="0"/>
-          </a:p>
-          <a:p>
-            <a:pPr marL="0" marR="0" lvl="0" indent="0" algn="l" defTabSz="914400" rtl="0" eaLnBrk="1" fontAlgn="auto" latinLnBrk="0" hangingPunct="1">
-              <a:lnSpc>
-                <a:spcPct val="100000"/>
-              </a:lnSpc>
-              <a:spcBef>
-                <a:spcPts val="0"/>
-              </a:spcBef>
-              <a:spcAft>
-                <a:spcPts val="0"/>
-              </a:spcAft>
-              <a:buClrTx/>
-              <a:buSzTx/>
-              <a:buFontTx/>
-              <a:buNone/>
-              <a:tabLst/>
-              <a:defRPr/>
-            </a:pPr>
-            <a:endParaRPr lang="en-US" dirty="0"/>
-          </a:p>
-          <a:p>
             <a:endParaRPr lang="en-US" dirty="0"/>
           </a:p>
           <a:p>
@@ -1413,7 +1440,7 @@
           <a:p>
             <a:fld id="{D62F27D6-02B0-9E4F-9688-CC4BB499F553}" type="slidenum">
               <a:rPr lang="en-US" smtClean="0"/>
-              <a:t>3</a:t>
+              <a:t>2</a:t>
             </a:fld>
             <a:endParaRPr lang="en-US"/>
           </a:p>
@@ -1476,247 +1503,7 @@
           <a:bodyPr/>
           <a:lstStyle/>
           <a:p>
-            <a:r>
-              <a:rPr lang="en-US" dirty="0"/>
-              <a:t>History lesson – ask here about the age of the audience</a:t>
-            </a:r>
-          </a:p>
-          <a:p>
             <a:endParaRPr lang="en-US" dirty="0"/>
-          </a:p>
-          <a:p>
-            <a:r>
-              <a:rPr lang="en-US" dirty="0"/>
-              <a:t>Disadvantages of old style:</a:t>
-            </a:r>
-          </a:p>
-          <a:p>
-            <a:pPr marL="171450" indent="-171450">
-              <a:buFontTx/>
-              <a:buChar char="-"/>
-            </a:pPr>
-            <a:r>
-              <a:rPr lang="en-US" dirty="0"/>
-              <a:t>Resources: hardware + software + networks</a:t>
-            </a:r>
-          </a:p>
-          <a:p>
-            <a:pPr marL="171450" indent="-171450">
-              <a:buFontTx/>
-              <a:buChar char="-"/>
-            </a:pPr>
-            <a:r>
-              <a:rPr lang="en-US" dirty="0"/>
-              <a:t>Costs or equipment</a:t>
-            </a:r>
-          </a:p>
-          <a:p>
-            <a:pPr marL="171450" indent="-171450">
-              <a:buFontTx/>
-              <a:buChar char="-"/>
-            </a:pPr>
-            <a:r>
-              <a:rPr lang="en-US" dirty="0"/>
-              <a:t>Cost of electricity</a:t>
-            </a:r>
-          </a:p>
-          <a:p>
-            <a:pPr marL="171450" indent="-171450">
-              <a:buFontTx/>
-              <a:buChar char="-"/>
-            </a:pPr>
-            <a:r>
-              <a:rPr lang="en-US" dirty="0"/>
-              <a:t>Cost or people to maintain them</a:t>
-            </a:r>
-          </a:p>
-          <a:p>
-            <a:pPr marL="171450" indent="-171450">
-              <a:buFontTx/>
-              <a:buChar char="-"/>
-            </a:pPr>
-            <a:r>
-              <a:rPr lang="en-US" dirty="0"/>
-              <a:t>You set up everything: software &amp; hardware, including networking</a:t>
-            </a:r>
-          </a:p>
-          <a:p>
-            <a:pPr marL="171450" indent="-171450">
-              <a:buFontTx/>
-              <a:buChar char="-"/>
-            </a:pPr>
-            <a:endParaRPr lang="en-US" dirty="0"/>
-          </a:p>
-          <a:p>
-            <a:pPr marL="0" indent="0">
-              <a:buFontTx/>
-              <a:buNone/>
-            </a:pPr>
-            <a:r>
-              <a:rPr lang="en-US" dirty="0"/>
-              <a:t>Biggest advantage: </a:t>
-            </a:r>
-          </a:p>
-          <a:p>
-            <a:pPr marL="171450" indent="-171450">
-              <a:buFontTx/>
-              <a:buChar char="-"/>
-            </a:pPr>
-            <a:r>
-              <a:rPr lang="en-US" dirty="0"/>
-              <a:t>Total control over it: direct access to software and hardware</a:t>
-            </a:r>
-          </a:p>
-          <a:p>
-            <a:pPr marL="171450" indent="-171450">
-              <a:buFontTx/>
-              <a:buChar char="-"/>
-            </a:pPr>
-            <a:endParaRPr lang="en-US" dirty="0"/>
-          </a:p>
-          <a:p>
-            <a:pPr marL="0" indent="0">
-              <a:buFontTx/>
-              <a:buNone/>
-            </a:pPr>
-            <a:r>
-              <a:rPr lang="en-US" dirty="0"/>
-              <a:t>Public clouds:</a:t>
-            </a:r>
-          </a:p>
-          <a:p>
-            <a:pPr marL="171450" indent="-171450">
-              <a:buFontTx/>
-              <a:buChar char="-"/>
-            </a:pPr>
-            <a:r>
-              <a:rPr lang="en-US" dirty="0"/>
-              <a:t>Amazon</a:t>
-            </a:r>
-          </a:p>
-          <a:p>
-            <a:pPr marL="171450" indent="-171450">
-              <a:buFontTx/>
-              <a:buChar char="-"/>
-            </a:pPr>
-            <a:r>
-              <a:rPr lang="en-US" dirty="0"/>
-              <a:t>Google Cloud platform</a:t>
-            </a:r>
-          </a:p>
-          <a:p>
-            <a:pPr marL="171450" indent="-171450">
-              <a:buFontTx/>
-              <a:buChar char="-"/>
-            </a:pPr>
-            <a:r>
-              <a:rPr lang="en-US" dirty="0"/>
-              <a:t>Microsoft Azure</a:t>
-            </a:r>
-          </a:p>
-          <a:p>
-            <a:pPr marL="171450" indent="-171450">
-              <a:buFontTx/>
-              <a:buChar char="-"/>
-            </a:pPr>
-            <a:r>
-              <a:rPr lang="en-US" dirty="0"/>
-              <a:t>Alibaba</a:t>
-            </a:r>
-          </a:p>
-          <a:p>
-            <a:pPr marL="171450" indent="-171450">
-              <a:buFontTx/>
-              <a:buChar char="-"/>
-            </a:pPr>
-            <a:r>
-              <a:rPr lang="en-US" dirty="0"/>
-              <a:t>Oracle</a:t>
-            </a:r>
-          </a:p>
-          <a:p>
-            <a:pPr marL="171450" indent="-171450">
-              <a:buFontTx/>
-              <a:buChar char="-"/>
-            </a:pPr>
-            <a:endParaRPr lang="en-US" dirty="0"/>
-          </a:p>
-          <a:p>
-            <a:pPr marL="0" indent="0">
-              <a:buFontTx/>
-              <a:buNone/>
-            </a:pPr>
-            <a:r>
-              <a:rPr lang="en-US" dirty="0"/>
-              <a:t>Advantages:</a:t>
-            </a:r>
-          </a:p>
-          <a:p>
-            <a:pPr marL="171450" indent="-171450">
-              <a:buFontTx/>
-              <a:buChar char="-"/>
-            </a:pPr>
-            <a:r>
-              <a:rPr lang="en-US" dirty="0"/>
-              <a:t>Scalability – old style -&gt; that server you had in your office was all you had</a:t>
-            </a:r>
-          </a:p>
-          <a:p>
-            <a:pPr marL="171450" indent="-171450">
-              <a:buFontTx/>
-              <a:buChar char="-"/>
-            </a:pPr>
-            <a:r>
-              <a:rPr lang="en-US" dirty="0"/>
-              <a:t>Disaster recovery -&gt; old style, recovery was costly and limited (you could have a backup server, or hard discs in a RAID setup</a:t>
-            </a:r>
-          </a:p>
-          <a:p>
-            <a:pPr marL="171450" indent="-171450">
-              <a:buFontTx/>
-              <a:buChar char="-"/>
-            </a:pPr>
-            <a:r>
-              <a:rPr lang="en-US" dirty="0"/>
-              <a:t>Keeping up to date - &lt;- also a disadvantage because you can only update to the supported version </a:t>
-            </a:r>
-          </a:p>
-          <a:p>
-            <a:pPr marL="171450" indent="-171450">
-              <a:buFontTx/>
-              <a:buChar char="-"/>
-            </a:pPr>
-            <a:r>
-              <a:rPr lang="en-US" dirty="0"/>
-              <a:t>Cost savings -&gt; technically yes, unless you configure your services wrong, or write a recursive lambda</a:t>
-            </a:r>
-          </a:p>
-          <a:p>
-            <a:pPr marL="171450" indent="-171450">
-              <a:buFontTx/>
-              <a:buChar char="-"/>
-            </a:pPr>
-            <a:endParaRPr lang="en-US" dirty="0"/>
-          </a:p>
-          <a:p>
-            <a:pPr marL="0" indent="0">
-              <a:buFontTx/>
-              <a:buNone/>
-            </a:pPr>
-            <a:r>
-              <a:rPr lang="en-US" dirty="0"/>
-              <a:t>Biggest disadvantage:</a:t>
-            </a:r>
-          </a:p>
-          <a:p>
-            <a:pPr marL="0" indent="0">
-              <a:buFontTx/>
-              <a:buNone/>
-            </a:pPr>
-            <a:r>
-              <a:rPr lang="en-US" dirty="0"/>
-              <a:t>- You are stuck to it. Moving from a cloud provider to another is very… close to impossible.</a:t>
-            </a:r>
           </a:p>
         </p:txBody>
       </p:sp>
@@ -1737,7 +1524,7 @@
           <a:p>
             <a:fld id="{D62F27D6-02B0-9E4F-9688-CC4BB499F553}" type="slidenum">
               <a:rPr lang="en-US" smtClean="0"/>
-              <a:t>5</a:t>
+              <a:t>3</a:t>
             </a:fld>
             <a:endParaRPr lang="en-US"/>
           </a:p>
@@ -1746,7 +1533,7 @@
     </p:spTree>
     <p:extLst>
       <p:ext uri="{BB962C8B-B14F-4D97-AF65-F5344CB8AC3E}">
-        <p14:creationId xmlns:p14="http://schemas.microsoft.com/office/powerpoint/2010/main" val="4233763727"/>
+        <p14:creationId xmlns:p14="http://schemas.microsoft.com/office/powerpoint/2010/main" val="1213932907"/>
       </p:ext>
     </p:extLst>
   </p:cSld>
@@ -1802,49 +1589,7 @@
           <a:p>
             <a:r>
               <a:rPr lang="en-US" dirty="0"/>
-              <a:t>The process of deploying your applications to the cloud is called: </a:t>
-            </a:r>
-            <a:r>
-              <a:rPr lang="en-US" b="1" dirty="0"/>
-              <a:t>provisioning cloud resources. </a:t>
-            </a:r>
-            <a:r>
-              <a:rPr lang="en-US" b="0" dirty="0"/>
-              <a:t>You write some configuration files with the resources you need to be created on the cloud provider and their properties, and some tool is responsible for making it happen.</a:t>
-            </a:r>
-          </a:p>
-          <a:p>
-            <a:r>
-              <a:rPr lang="en-US" b="0" dirty="0"/>
-              <a:t>Big cloud providers provide their own tools for </a:t>
-            </a:r>
-            <a:r>
-              <a:rPr lang="en-GB" dirty="0"/>
-              <a:t>create, deploy and manage infrastructure as code.</a:t>
-            </a:r>
-          </a:p>
-          <a:p>
-            <a:r>
-              <a:rPr lang="en-GB" b="0" dirty="0"/>
-              <a:t>Terraform &amp; </a:t>
-            </a:r>
-            <a:r>
-              <a:rPr lang="en-GB" b="0" dirty="0" err="1"/>
-              <a:t>Pulumi</a:t>
-            </a:r>
-            <a:r>
-              <a:rPr lang="en-GB" b="0" dirty="0"/>
-              <a:t> are opensource and free to use.</a:t>
-            </a:r>
-            <a:endParaRPr lang="en-US" b="0" dirty="0"/>
-          </a:p>
-          <a:p>
-            <a:endParaRPr lang="en-US" b="0" dirty="0"/>
-          </a:p>
-          <a:p>
-            <a:r>
-              <a:rPr lang="en-US" b="1" dirty="0"/>
-              <a:t>This can be done in a few ways:</a:t>
+              <a:t>History lesson – ask here about the age of the audience</a:t>
             </a:r>
           </a:p>
           <a:p>
@@ -1853,7 +1598,7 @@
           <a:p>
             <a:r>
               <a:rPr lang="en-US" dirty="0"/>
-              <a:t>Design your application for the cloud</a:t>
+              <a:t>Disadvantages of old style:</a:t>
             </a:r>
           </a:p>
           <a:p>
@@ -1863,7 +1608,7 @@
             </a:pPr>
             <a:r>
               <a:rPr lang="en-US" dirty="0"/>
-              <a:t>Use static frontends</a:t>
+              <a:t>Resources: hardware + software + networks</a:t>
             </a:r>
           </a:p>
           <a:p>
@@ -1873,7 +1618,37 @@
             </a:pPr>
             <a:r>
               <a:rPr lang="en-US" dirty="0"/>
-              <a:t>Scalable backends &amp; databases</a:t>
+              <a:t>Costs or equipment</a:t>
+            </a:r>
+          </a:p>
+          <a:p>
+            <a:pPr marL="171450" indent="-171450">
+              <a:buFontTx/>
+              <a:buChar char="-"/>
+            </a:pPr>
+            <a:r>
+              <a:rPr lang="en-US" dirty="0"/>
+              <a:t>Cost of electricity</a:t>
+            </a:r>
+          </a:p>
+          <a:p>
+            <a:pPr marL="171450" indent="-171450">
+              <a:buFontTx/>
+              <a:buChar char="-"/>
+            </a:pPr>
+            <a:r>
+              <a:rPr lang="en-US" dirty="0"/>
+              <a:t>Cost or people to maintain them</a:t>
+            </a:r>
+          </a:p>
+          <a:p>
+            <a:pPr marL="171450" indent="-171450">
+              <a:buFontTx/>
+              <a:buChar char="-"/>
+            </a:pPr>
+            <a:r>
+              <a:rPr lang="en-US" dirty="0"/>
+              <a:t>You set up everything: software &amp; hardware, including networking</a:t>
             </a:r>
           </a:p>
           <a:p>
@@ -1884,13 +1659,23 @@
             <a:endParaRPr lang="en-US" dirty="0"/>
           </a:p>
           <a:p>
+            <a:pPr marL="0" indent="0">
+              <a:buFontTx/>
+              <a:buNone/>
+            </a:pPr>
+            <a:r>
+              <a:rPr lang="en-US" dirty="0"/>
+              <a:t>Biggest advantage: </a:t>
+            </a:r>
+          </a:p>
+          <a:p>
             <a:pPr marL="171450" indent="-171450">
               <a:buFontTx/>
               <a:buChar char="-"/>
             </a:pPr>
             <a:r>
               <a:rPr lang="en-US" dirty="0"/>
-              <a:t>Manually – eh … setup the network, VMs, and all other resources using the cloud provider web console and CLI</a:t>
+              <a:t>Total control over it: direct access to software and hardware</a:t>
             </a:r>
           </a:p>
           <a:p>
@@ -1898,9 +1683,16 @@
               <a:buFontTx/>
               <a:buChar char="-"/>
             </a:pPr>
+            <a:endParaRPr lang="en-US" dirty="0"/>
+          </a:p>
+          <a:p>
+            <a:pPr marL="0" indent="0">
+              <a:buFontTx/>
+              <a:buNone/>
+            </a:pPr>
             <a:r>
               <a:rPr lang="en-US" dirty="0"/>
-              <a:t>CloudFormation &lt;-provided by AWS -&gt; you describe your infrastructure using  a JSON based resource specification</a:t>
+              <a:t>Public clouds, you get a web interface and various CLIs:</a:t>
             </a:r>
           </a:p>
           <a:p>
@@ -1910,8 +1702,13 @@
             </a:pPr>
             <a:r>
               <a:rPr lang="en-US" dirty="0"/>
-              <a:t>Deployment Manager &lt;- provided by GCP-&gt; you describe your infrastructure using  a YAML based resource specification</a:t>
-            </a:r>
+              <a:t>Amazon – this looks </a:t>
+            </a:r>
+            <a:r>
+              <a:rPr lang="en-US" dirty="0" err="1"/>
+              <a:t>familliar</a:t>
+            </a:r>
+            <a:endParaRPr lang="en-US" dirty="0"/>
           </a:p>
           <a:p>
             <a:pPr marL="171450" indent="-171450">
@@ -1920,27 +1717,7 @@
             </a:pPr>
             <a:r>
               <a:rPr lang="en-US" dirty="0"/>
-              <a:t>Terraform  &lt;- uses a JSON-like based specification, the </a:t>
-            </a:r>
-            <a:r>
-              <a:rPr lang="en-GB" i="1" dirty="0"/>
-              <a:t>native syntax</a:t>
-            </a:r>
-            <a:r>
-              <a:rPr lang="en-GB" dirty="0"/>
-              <a:t> of the Terraform language, called also HCL - </a:t>
-            </a:r>
-            <a:r>
-              <a:rPr lang="en-GB" b="1" dirty="0" err="1"/>
-              <a:t>HashiCorp</a:t>
-            </a:r>
-            <a:r>
-              <a:rPr lang="en-GB" b="1" dirty="0"/>
-              <a:t> Configuration Language </a:t>
-            </a:r>
-            <a:r>
-              <a:rPr lang="en-GB" b="0" dirty="0"/>
-              <a:t>(JSON can also be used)</a:t>
+              <a:t>Google Cloud platform</a:t>
             </a:r>
           </a:p>
           <a:p>
@@ -1949,28 +1726,112 @@
               <a:buChar char="-"/>
             </a:pPr>
             <a:r>
-              <a:rPr lang="en-GB" b="0" dirty="0" err="1"/>
-              <a:t>Pulumi</a:t>
-            </a:r>
-            <a:r>
-              <a:rPr lang="en-GB" b="0" dirty="0"/>
-              <a:t> &lt;- describes infrastructure using various programming languages: Java, JavaScript, Go  etc… </a:t>
-            </a:r>
-            <a:endParaRPr lang="en-US" b="0" dirty="0"/>
-          </a:p>
-          <a:p>
+              <a:rPr lang="en-US" dirty="0"/>
+              <a:t>Microsoft Azure</a:t>
+            </a:r>
+          </a:p>
+          <a:p>
+            <a:pPr marL="171450" indent="-171450">
+              <a:buFontTx/>
+              <a:buChar char="-"/>
+            </a:pPr>
+            <a:r>
+              <a:rPr lang="en-US" dirty="0"/>
+              <a:t>Alibaba</a:t>
+            </a:r>
+          </a:p>
+          <a:p>
+            <a:pPr marL="171450" indent="-171450">
+              <a:buFontTx/>
+              <a:buChar char="-"/>
+            </a:pPr>
+            <a:r>
+              <a:rPr lang="en-US" dirty="0"/>
+              <a:t>Oracle</a:t>
+            </a:r>
+          </a:p>
+          <a:p>
+            <a:pPr marL="171450" indent="-171450">
+              <a:buFontTx/>
+              <a:buChar char="-"/>
+            </a:pPr>
             <a:endParaRPr lang="en-US" dirty="0"/>
           </a:p>
           <a:p>
+            <a:pPr marL="0" indent="0">
+              <a:buFontTx/>
+              <a:buNone/>
+            </a:pPr>
             <a:r>
               <a:rPr lang="en-US" dirty="0"/>
-              <a:t>Each of these tools offer the possibility of describing your infrastructure using code or structured test, provide the means to instruct a cloud provider to create those resources for you and monitor those resources to an extent. </a:t>
-            </a:r>
-          </a:p>
-          <a:p>
+              <a:t>Advantages:</a:t>
+            </a:r>
+          </a:p>
+          <a:p>
+            <a:pPr marL="171450" indent="-171450">
+              <a:buFontTx/>
+              <a:buChar char="-"/>
+            </a:pPr>
             <a:r>
               <a:rPr lang="en-US" dirty="0"/>
-              <a:t>Each of them has drawbacks, for example using tools specific to a cloud provider ties you to that cloud provider, using open-source tools brings the risk of vulnerabilities and bug that take long to fix.</a:t>
+              <a:t>Scalability – old style -&gt; that server you had in your office was all you had</a:t>
+            </a:r>
+          </a:p>
+          <a:p>
+            <a:pPr marL="171450" indent="-171450">
+              <a:buFontTx/>
+              <a:buChar char="-"/>
+            </a:pPr>
+            <a:r>
+              <a:rPr lang="en-US" dirty="0"/>
+              <a:t>Disaster recovery -&gt; old style, recovery was costly and limited (you could have a backup server, or hard discs in a RAID setup</a:t>
+            </a:r>
+          </a:p>
+          <a:p>
+            <a:pPr marL="171450" indent="-171450">
+              <a:buFontTx/>
+              <a:buChar char="-"/>
+            </a:pPr>
+            <a:r>
+              <a:rPr lang="en-US" dirty="0"/>
+              <a:t>Keeping up to date - &lt;- also a disadvantage because you can only update to the supported version </a:t>
+            </a:r>
+          </a:p>
+          <a:p>
+            <a:pPr marL="171450" indent="-171450">
+              <a:buFontTx/>
+              <a:buChar char="-"/>
+            </a:pPr>
+            <a:r>
+              <a:rPr lang="en-US" dirty="0"/>
+              <a:t>Cost savings -&gt; technically yes, unless you configure your services wrong, or write a recursive lambda</a:t>
+            </a:r>
+          </a:p>
+          <a:p>
+            <a:pPr marL="171450" indent="-171450">
+              <a:buFontTx/>
+              <a:buChar char="-"/>
+            </a:pPr>
+            <a:endParaRPr lang="en-US" dirty="0"/>
+          </a:p>
+          <a:p>
+            <a:pPr marL="0" indent="0">
+              <a:buFontTx/>
+              <a:buNone/>
+            </a:pPr>
+            <a:r>
+              <a:rPr lang="en-US" dirty="0"/>
+              <a:t>Biggest disadvantage:</a:t>
+            </a:r>
+          </a:p>
+          <a:p>
+            <a:pPr marL="0" indent="0">
+              <a:buFontTx/>
+              <a:buNone/>
+            </a:pPr>
+            <a:r>
+              <a:rPr lang="en-US" dirty="0"/>
+              <a:t>- You are stuck to it. Moving from a cloud provider to another is very… close to impossible.</a:t>
             </a:r>
           </a:p>
         </p:txBody>
@@ -1992,7 +1853,7 @@
           <a:p>
             <a:fld id="{D62F27D6-02B0-9E4F-9688-CC4BB499F553}" type="slidenum">
               <a:rPr lang="en-US" smtClean="0"/>
-              <a:t>6</a:t>
+              <a:t>5</a:t>
             </a:fld>
             <a:endParaRPr lang="en-US"/>
           </a:p>
@@ -2001,7 +1862,7 @@
     </p:spTree>
     <p:extLst>
       <p:ext uri="{BB962C8B-B14F-4D97-AF65-F5344CB8AC3E}">
-        <p14:creationId xmlns:p14="http://schemas.microsoft.com/office/powerpoint/2010/main" val="3763948865"/>
+        <p14:creationId xmlns:p14="http://schemas.microsoft.com/office/powerpoint/2010/main" val="4233763727"/>
       </p:ext>
     </p:extLst>
   </p:cSld>
@@ -2057,37 +1918,70 @@
           <a:p>
             <a:r>
               <a:rPr lang="en-US" dirty="0"/>
-              <a:t>Apache Brooklyn is an open-source software for creation, </a:t>
-            </a:r>
-            <a:r>
-              <a:rPr lang="en-GB" b="0" i="0" dirty="0">
-                <a:solidFill>
-                  <a:srgbClr val="BDC1C6"/>
-                </a:solidFill>
-                <a:effectLst/>
-                <a:latin typeface="arial" panose="020B0604020202020204" pitchFamily="34" charset="0"/>
-              </a:rPr>
-              <a:t>management and destruction of cloud resources – infrastructure and code. Thus, this makes it a </a:t>
-            </a:r>
-            <a:r>
-              <a:rPr lang="en-GB" b="1" i="0" dirty="0">
-                <a:solidFill>
-                  <a:srgbClr val="BDC1C6"/>
-                </a:solidFill>
-                <a:effectLst/>
-                <a:latin typeface="arial" panose="020B0604020202020204" pitchFamily="34" charset="0"/>
-              </a:rPr>
-              <a:t>cloud orchestration software</a:t>
-            </a:r>
-            <a:r>
-              <a:rPr lang="en-GB" b="0" i="0" dirty="0">
-                <a:solidFill>
-                  <a:srgbClr val="BDC1C6"/>
-                </a:solidFill>
-                <a:effectLst/>
-                <a:latin typeface="arial" panose="020B0604020202020204" pitchFamily="34" charset="0"/>
-              </a:rPr>
-              <a:t>. </a:t>
+              <a:t>The process of deploying your applications to the cloud is called: </a:t>
+            </a:r>
+            <a:r>
+              <a:rPr lang="en-US" b="1" dirty="0"/>
+              <a:t>provisioning cloud resources. </a:t>
+            </a:r>
+            <a:r>
+              <a:rPr lang="en-US" b="0" dirty="0"/>
+              <a:t>You write some configuration files with the resources you need to be created on the cloud provider and their properties, and some tool is responsible for making it happen.</a:t>
+            </a:r>
+          </a:p>
+          <a:p>
+            <a:r>
+              <a:rPr lang="en-US" b="0" dirty="0"/>
+              <a:t>Big cloud providers provide their own tools for </a:t>
+            </a:r>
+            <a:r>
+              <a:rPr lang="en-GB" dirty="0"/>
+              <a:t>create, deploy and manage infrastructure as code.</a:t>
+            </a:r>
+          </a:p>
+          <a:p>
+            <a:r>
+              <a:rPr lang="en-GB" b="0" dirty="0"/>
+              <a:t>Terraform &amp; </a:t>
+            </a:r>
+            <a:r>
+              <a:rPr lang="en-GB" b="0" dirty="0" err="1"/>
+              <a:t>Pulumi</a:t>
+            </a:r>
+            <a:r>
+              <a:rPr lang="en-GB" b="0" dirty="0"/>
+              <a:t> are opensource and free to use.</a:t>
+            </a:r>
+          </a:p>
+          <a:p>
+            <a:endParaRPr lang="en-GB" b="0" dirty="0"/>
+          </a:p>
+          <a:p>
+            <a:endParaRPr lang="en-GB" b="0" dirty="0"/>
+          </a:p>
+          <a:p>
+            <a:r>
+              <a:rPr lang="en-GB" b="0" dirty="0"/>
+              <a:t>The crazy way: do it manually.  This actually works, if all you have is a blog.  :D I know from personal experience.</a:t>
+            </a:r>
+            <a:endParaRPr lang="en-US" b="0" dirty="0"/>
+          </a:p>
+          <a:p>
+            <a:endParaRPr lang="en-US" b="0" dirty="0"/>
+          </a:p>
+          <a:p>
+            <a:r>
+              <a:rPr lang="en-US" b="1" dirty="0"/>
+              <a:t>This can be done in a few ways:</a:t>
+            </a:r>
+          </a:p>
+          <a:p>
+            <a:endParaRPr lang="en-US" dirty="0"/>
+          </a:p>
+          <a:p>
+            <a:r>
+              <a:rPr lang="en-US" dirty="0"/>
+              <a:t>Design your application for the cloud</a:t>
             </a:r>
           </a:p>
           <a:p>
@@ -2096,14 +1990,8 @@
               <a:buChar char="-"/>
             </a:pPr>
             <a:r>
-              <a:rPr lang="en-GB" b="0" i="0" dirty="0">
-                <a:solidFill>
-                  <a:srgbClr val="BDC1C6"/>
-                </a:solidFill>
-                <a:effectLst/>
-                <a:latin typeface="arial" panose="020B0604020202020204" pitchFamily="34" charset="0"/>
-              </a:rPr>
-              <a:t>Mention CAMP + types + DSL</a:t>
+              <a:rPr lang="en-US" dirty="0"/>
+              <a:t>Use static frontends</a:t>
             </a:r>
           </a:p>
           <a:p>
@@ -2112,66 +2000,8 @@
               <a:buChar char="-"/>
             </a:pPr>
             <a:r>
-              <a:rPr lang="en-GB" b="1" i="1" dirty="0"/>
-              <a:t>C</a:t>
-            </a:r>
-            <a:r>
-              <a:rPr lang="en-GB" i="1" dirty="0"/>
-              <a:t>loud </a:t>
-            </a:r>
-            <a:r>
-              <a:rPr lang="en-GB" b="1" i="1" dirty="0"/>
-              <a:t>A</a:t>
-            </a:r>
-            <a:r>
-              <a:rPr lang="en-GB" i="1" dirty="0"/>
-              <a:t>pplication </a:t>
-            </a:r>
-            <a:r>
-              <a:rPr lang="en-GB" b="1" i="1" dirty="0"/>
-              <a:t>M</a:t>
-            </a:r>
-            <a:r>
-              <a:rPr lang="en-GB" i="1" dirty="0"/>
-              <a:t>anagement for </a:t>
-            </a:r>
-            <a:r>
-              <a:rPr lang="en-GB" b="1" i="1" dirty="0"/>
-              <a:t>P</a:t>
-            </a:r>
-            <a:r>
-              <a:rPr lang="en-GB" i="1" dirty="0"/>
-              <a:t>latforms (</a:t>
-            </a:r>
-            <a:r>
-              <a:rPr lang="en-GB" dirty="0"/>
-              <a:t>CAMP) is a specification designed to ease management of applications, including packaging and deployment, across </a:t>
-            </a:r>
-            <a:r>
-              <a:rPr lang="en-GB" dirty="0">
-                <a:hlinkClick r:id="rId3"/>
-              </a:rPr>
-              <a:t>public</a:t>
-            </a:r>
-            <a:r>
-              <a:rPr lang="en-GB" dirty="0"/>
-              <a:t> and </a:t>
-            </a:r>
-            <a:r>
-              <a:rPr lang="en-GB" dirty="0">
-                <a:hlinkClick r:id="rId4"/>
-              </a:rPr>
-              <a:t>private </a:t>
-            </a:r>
-            <a:r>
-              <a:rPr lang="en-GB" dirty="0">
-                <a:hlinkClick r:id="rId5"/>
-              </a:rPr>
-              <a:t>cloud computing</a:t>
-            </a:r>
-            <a:r>
-              <a:rPr lang="en-GB" dirty="0"/>
-              <a:t> platforms.</a:t>
+              <a:rPr lang="en-US" dirty="0"/>
+              <a:t>Scalable backends &amp; databases</a:t>
             </a:r>
           </a:p>
           <a:p>
@@ -2179,13 +2009,7 @@
               <a:buFontTx/>
               <a:buChar char="-"/>
             </a:pPr>
-            <a:endParaRPr lang="en-GB" b="0" i="0" dirty="0">
-              <a:solidFill>
-                <a:srgbClr val="BDC1C6"/>
-              </a:solidFill>
-              <a:effectLst/>
-              <a:latin typeface="arial" panose="020B0604020202020204" pitchFamily="34" charset="0"/>
-            </a:endParaRPr>
+            <a:endParaRPr lang="en-US" dirty="0"/>
           </a:p>
           <a:p>
             <a:pPr marL="171450" indent="-171450">
@@ -2193,14 +2017,8 @@
               <a:buChar char="-"/>
             </a:pPr>
             <a:r>
-              <a:rPr lang="en-GB" b="0" i="0" dirty="0">
-                <a:solidFill>
-                  <a:srgbClr val="BDC1C6"/>
-                </a:solidFill>
-                <a:effectLst/>
-                <a:latin typeface="arial" panose="020B0604020202020204" pitchFamily="34" charset="0"/>
-              </a:rPr>
-              <a:t>Deploy it anywhere - public or private, cloud or Kubernetes cluster</a:t>
+              <a:rPr lang="en-US" dirty="0"/>
+              <a:t>Manually – eh … setup the network, VMs, and all other resources using the cloud provider web console and CLI</a:t>
             </a:r>
           </a:p>
           <a:p>
@@ -2208,13 +2026,10 @@
               <a:buFontTx/>
               <a:buChar char="-"/>
             </a:pPr>
-            <a:endParaRPr lang="en-GB" b="0" i="0" dirty="0">
-              <a:solidFill>
-                <a:srgbClr val="BDC1C6"/>
-              </a:solidFill>
-              <a:effectLst/>
-              <a:latin typeface="arial" panose="020B0604020202020204" pitchFamily="34" charset="0"/>
-            </a:endParaRPr>
+            <a:r>
+              <a:rPr lang="en-US" dirty="0"/>
+              <a:t>CloudFormation &lt;-provided by AWS -&gt; you describe your infrastructure using  a JSON based resource specification</a:t>
+            </a:r>
           </a:p>
           <a:p>
             <a:pPr marL="171450" indent="-171450">
@@ -2222,28 +2037,8 @@
               <a:buChar char="-"/>
             </a:pPr>
             <a:r>
-              <a:rPr lang="en-GB" dirty="0"/>
-              <a:t>Apache Brooklyn is built for agile deployment of applications across cloud and other targets, and real-time </a:t>
-            </a:r>
-            <a:r>
-              <a:rPr lang="en-GB" dirty="0">
-                <a:hlinkClick r:id="rId6" tooltip="Refers to the self-managing characteristics of distributed computing resources,&#10;adapting to unpredictable changes while hiding intrinsic complexity to&#10;operators and users."/>
-              </a:rPr>
-              <a:t>autonomic</a:t>
-            </a:r>
-            <a:r>
-              <a:rPr lang="en-GB" dirty="0"/>
-              <a:t> management. "</a:t>
-            </a:r>
-            <a:r>
-              <a:rPr lang="en-GB" dirty="0">
-                <a:hlinkClick r:id="rId6" tooltip="Refers to the self-managing characteristics of distributed computing resources,&#10;adapting to unpredictable changes while hiding intrinsic complexity to&#10;operators and users."/>
-              </a:rPr>
-              <a:t>Autonomic</a:t>
-            </a:r>
-            <a:r>
-              <a:rPr lang="en-GB" dirty="0"/>
-              <a:t> computing" is the concept of components looking after themselves where possible (self-healing, self-optimizing, etc).</a:t>
+              <a:rPr lang="en-US" dirty="0"/>
+              <a:t>Deployment Manager &lt;- provided by GCP-&gt; you describe your infrastructure using  a YAML based resource specification</a:t>
             </a:r>
           </a:p>
           <a:p>
@@ -2251,13 +2046,30 @@
               <a:buFontTx/>
               <a:buChar char="-"/>
             </a:pPr>
-            <a:endParaRPr lang="en-GB" b="0" i="0" dirty="0">
-              <a:solidFill>
-                <a:srgbClr val="BDC1C6"/>
-              </a:solidFill>
-              <a:effectLst/>
-              <a:latin typeface="arial" panose="020B0604020202020204" pitchFamily="34" charset="0"/>
-            </a:endParaRPr>
+            <a:r>
+              <a:rPr lang="en-US" dirty="0"/>
+              <a:t>Terraform  &lt;- uses a JSON-like based specification, the </a:t>
+            </a:r>
+            <a:r>
+              <a:rPr lang="en-GB" i="1" dirty="0"/>
+              <a:t>native syntax</a:t>
+            </a:r>
+            <a:r>
+              <a:rPr lang="en-GB" dirty="0"/>
+              <a:t> of the Terraform language, called also HCL - </a:t>
+            </a:r>
+            <a:r>
+              <a:rPr lang="en-GB" b="1" dirty="0" err="1"/>
+              <a:t>HashiCorp</a:t>
+            </a:r>
+            <a:r>
+              <a:rPr lang="en-GB" b="1" dirty="0"/>
+              <a:t> Configuration Language </a:t>
+            </a:r>
+            <a:r>
+              <a:rPr lang="en-GB" b="0" dirty="0"/>
+              <a:t>(JSON can also be used)</a:t>
+            </a:r>
           </a:p>
           <a:p>
             <a:pPr marL="171450" indent="-171450">
@@ -2265,122 +2077,37 @@
               <a:buChar char="-"/>
             </a:pPr>
             <a:r>
-              <a:rPr lang="en-GB" b="0" i="0" dirty="0">
-                <a:solidFill>
-                  <a:srgbClr val="BDC1C6"/>
-                </a:solidFill>
-                <a:effectLst/>
-                <a:latin typeface="arial" panose="020B0604020202020204" pitchFamily="34" charset="0"/>
-              </a:rPr>
-              <a:t>Basically, Apache Brooklyn is a </a:t>
-            </a:r>
-            <a:r>
-              <a:rPr lang="en-GB" b="0" i="0" dirty="0" err="1">
-                <a:solidFill>
-                  <a:srgbClr val="BDC1C6"/>
-                </a:solidFill>
-                <a:effectLst/>
-                <a:latin typeface="arial" panose="020B0604020202020204" pitchFamily="34" charset="0"/>
-              </a:rPr>
-              <a:t>swiss</a:t>
-            </a:r>
-            <a:r>
-              <a:rPr lang="en-GB" b="0" i="0" dirty="0">
-                <a:solidFill>
-                  <a:srgbClr val="BDC1C6"/>
-                </a:solidFill>
-                <a:effectLst/>
-                <a:latin typeface="arial" panose="020B0604020202020204" pitchFamily="34" charset="0"/>
-              </a:rPr>
-              <a:t> army knife – helps you easily model your cloud application, deploy it, monitor it and if used right it can keep your application available at all times. </a:t>
-            </a:r>
-          </a:p>
-          <a:p>
-            <a:pPr marL="171450" indent="-171450">
-              <a:buFontTx/>
-              <a:buChar char="-"/>
-            </a:pPr>
-            <a:r>
-              <a:rPr lang="en-GB" b="0" i="0" dirty="0">
-                <a:solidFill>
-                  <a:srgbClr val="BDC1C6"/>
-                </a:solidFill>
-                <a:effectLst/>
-                <a:latin typeface="arial" panose="020B0604020202020204" pitchFamily="34" charset="0"/>
-              </a:rPr>
-              <a:t>But two things that I keep telling </a:t>
-            </a:r>
-            <a:r>
-              <a:rPr lang="en-GB" b="0" i="0" dirty="0" err="1">
-                <a:solidFill>
-                  <a:srgbClr val="BDC1C6"/>
-                </a:solidFill>
-                <a:effectLst/>
-                <a:latin typeface="arial" panose="020B0604020202020204" pitchFamily="34" charset="0"/>
-              </a:rPr>
-              <a:t>Cloudsoft</a:t>
-            </a:r>
-            <a:r>
-              <a:rPr lang="en-GB" b="0" i="0" dirty="0">
-                <a:solidFill>
-                  <a:srgbClr val="BDC1C6"/>
-                </a:solidFill>
-                <a:effectLst/>
-                <a:latin typeface="arial" panose="020B0604020202020204" pitchFamily="34" charset="0"/>
-              </a:rPr>
-              <a:t>  they should brag more about Apache Brooklyn:</a:t>
-            </a:r>
-          </a:p>
-          <a:p>
-            <a:pPr marL="628650" lvl="1" indent="-171450">
-              <a:buFontTx/>
-              <a:buChar char="-"/>
-            </a:pPr>
-            <a:r>
-              <a:rPr lang="en-GB" b="0" i="0" dirty="0">
-                <a:solidFill>
-                  <a:srgbClr val="BDC1C6"/>
-                </a:solidFill>
-                <a:effectLst/>
-                <a:latin typeface="arial" panose="020B0604020202020204" pitchFamily="34" charset="0"/>
-              </a:rPr>
-              <a:t>Avoid cloud costs during development</a:t>
-            </a:r>
-          </a:p>
-          <a:p>
-            <a:pPr marL="628650" lvl="1" indent="-171450">
-              <a:buFontTx/>
-              <a:buChar char="-"/>
-            </a:pPr>
-            <a:r>
-              <a:rPr lang="en-GB" b="0" i="0" dirty="0">
-                <a:solidFill>
-                  <a:srgbClr val="BDC1C6"/>
-                </a:solidFill>
-                <a:effectLst/>
-                <a:latin typeface="arial" panose="020B0604020202020204" pitchFamily="34" charset="0"/>
-              </a:rPr>
-              <a:t>Relaxing the tie you have with your cloud provider -&gt; example: if your application does not use specific cloud services like lambda functions -&gt; e.g. it just represented by a bunch of services that can be installed on any VM, or a bunch of containers that can be run in any </a:t>
-            </a:r>
-            <a:r>
-              <a:rPr lang="en-GB" b="0" i="0" dirty="0" err="1">
-                <a:solidFill>
-                  <a:srgbClr val="BDC1C6"/>
-                </a:solidFill>
-                <a:effectLst/>
-                <a:latin typeface="arial" panose="020B0604020202020204" pitchFamily="34" charset="0"/>
-              </a:rPr>
-              <a:t>Kubernets</a:t>
-            </a:r>
-            <a:r>
-              <a:rPr lang="en-GB" b="0" i="0" dirty="0">
-                <a:solidFill>
-                  <a:srgbClr val="BDC1C6"/>
-                </a:solidFill>
-                <a:effectLst/>
-                <a:latin typeface="arial" panose="020B0604020202020204" pitchFamily="34" charset="0"/>
-              </a:rPr>
-              <a:t> cluster, you can use the same CAMP configuration, change the location in Apache Brooklyn and deploy it in the new cloud of your choice.  You still have to do some work if you want to move data from a database to another, but oh well…</a:t>
+              <a:rPr lang="en-GB" b="0" dirty="0" err="1"/>
+              <a:t>Pulumi</a:t>
+            </a:r>
+            <a:r>
+              <a:rPr lang="en-GB" b="0" dirty="0"/>
+              <a:t> &lt;- describes infrastructure using various programming languages: Java, JavaScript, Go  etc… </a:t>
+            </a:r>
+            <a:endParaRPr lang="en-US" b="0" dirty="0"/>
+          </a:p>
+          <a:p>
+            <a:endParaRPr lang="en-US" dirty="0"/>
+          </a:p>
+          <a:p>
+            <a:r>
+              <a:rPr lang="en-US" dirty="0"/>
+              <a:t>Each of these tools offer the possibility of describing your infrastructure using code or structured test, provide the means to instruct a cloud provider to create those resources for you and monitor those resources to an extent. </a:t>
+            </a:r>
+          </a:p>
+          <a:p>
+            <a:r>
+              <a:rPr lang="en-US" dirty="0"/>
+              <a:t>Each of them has drawbacks, for example using tools specific to a cloud provider ties you to that cloud provider, using open-source tools brings the risk of vulnerabilities and bug that take long to fix.</a:t>
+            </a:r>
+          </a:p>
+          <a:p>
+            <a:endParaRPr lang="en-US" dirty="0"/>
+          </a:p>
+          <a:p>
+            <a:r>
+              <a:rPr lang="en-US" dirty="0"/>
+              <a:t>If you want to avoid tying yourself to a cloud provider even more than you already are, or you want to give control over creating and destroying the resources to a Continuous integration tool for example.</a:t>
             </a:r>
           </a:p>
         </p:txBody>
@@ -2402,7 +2129,7 @@
           <a:p>
             <a:fld id="{D62F27D6-02B0-9E4F-9688-CC4BB499F553}" type="slidenum">
               <a:rPr lang="en-US" smtClean="0"/>
-              <a:t>8</a:t>
+              <a:t>6</a:t>
             </a:fld>
             <a:endParaRPr lang="en-US"/>
           </a:p>
@@ -2411,7 +2138,7 @@
     </p:spTree>
     <p:extLst>
       <p:ext uri="{BB962C8B-B14F-4D97-AF65-F5344CB8AC3E}">
-        <p14:creationId xmlns:p14="http://schemas.microsoft.com/office/powerpoint/2010/main" val="1738113888"/>
+        <p14:creationId xmlns:p14="http://schemas.microsoft.com/office/powerpoint/2010/main" val="3763948865"/>
       </p:ext>
     </p:extLst>
   </p:cSld>
@@ -2501,18 +2228,6 @@
             </a:r>
           </a:p>
           <a:p>
-            <a:r>
-              <a:rPr lang="en-GB" b="0" i="0" dirty="0">
-                <a:solidFill>
-                  <a:srgbClr val="BDC1C6"/>
-                </a:solidFill>
-                <a:effectLst/>
-                <a:latin typeface="arial" panose="020B0604020202020204" pitchFamily="34" charset="0"/>
-              </a:rPr>
-              <a:t>TODO – </a:t>
-            </a:r>
-          </a:p>
-          <a:p>
             <a:pPr marL="171450" indent="-171450">
               <a:buFontTx/>
               <a:buChar char="-"/>
@@ -2534,6 +2249,87 @@
               <a:buChar char="-"/>
             </a:pPr>
             <a:r>
+              <a:rPr lang="en-GB" b="1" i="1" dirty="0"/>
+              <a:t>C</a:t>
+            </a:r>
+            <a:r>
+              <a:rPr lang="en-GB" i="1" dirty="0"/>
+              <a:t>loud </a:t>
+            </a:r>
+            <a:r>
+              <a:rPr lang="en-GB" b="1" i="1" dirty="0"/>
+              <a:t>A</a:t>
+            </a:r>
+            <a:r>
+              <a:rPr lang="en-GB" i="1" dirty="0"/>
+              <a:t>pplication </a:t>
+            </a:r>
+            <a:r>
+              <a:rPr lang="en-GB" b="1" i="1" dirty="0"/>
+              <a:t>M</a:t>
+            </a:r>
+            <a:r>
+              <a:rPr lang="en-GB" i="1" dirty="0"/>
+              <a:t>anagement for </a:t>
+            </a:r>
+            <a:r>
+              <a:rPr lang="en-GB" b="1" i="1" dirty="0"/>
+              <a:t>P</a:t>
+            </a:r>
+            <a:r>
+              <a:rPr lang="en-GB" i="1" dirty="0"/>
+              <a:t>latforms (</a:t>
+            </a:r>
+            <a:r>
+              <a:rPr lang="en-GB" dirty="0"/>
+              <a:t>CAMP) is a specification designed to ease management of applications, including packaging and deployment, across </a:t>
+            </a:r>
+            <a:r>
+              <a:rPr lang="en-GB" dirty="0">
+                <a:hlinkClick r:id="rId3"/>
+              </a:rPr>
+              <a:t>public</a:t>
+            </a:r>
+            <a:r>
+              <a:rPr lang="en-GB" dirty="0"/>
+              <a:t> and </a:t>
+            </a:r>
+            <a:r>
+              <a:rPr lang="en-GB" dirty="0">
+                <a:hlinkClick r:id="rId4"/>
+              </a:rPr>
+              <a:t>private </a:t>
+            </a:r>
+            <a:r>
+              <a:rPr lang="en-GB" dirty="0">
+                <a:hlinkClick r:id="rId5"/>
+              </a:rPr>
+              <a:t>cloud computing</a:t>
+            </a:r>
+            <a:r>
+              <a:rPr lang="en-GB" dirty="0"/>
+              <a:t> platforms.</a:t>
+            </a:r>
+          </a:p>
+          <a:p>
+            <a:pPr marL="171450" indent="-171450">
+              <a:buFontTx/>
+              <a:buChar char="-"/>
+            </a:pPr>
+            <a:endParaRPr lang="en-GB" b="0" i="0" dirty="0">
+              <a:solidFill>
+                <a:srgbClr val="BDC1C6"/>
+              </a:solidFill>
+              <a:effectLst/>
+              <a:latin typeface="arial" panose="020B0604020202020204" pitchFamily="34" charset="0"/>
+            </a:endParaRPr>
+          </a:p>
+          <a:p>
+            <a:pPr marL="171450" indent="-171450">
+              <a:buFontTx/>
+              <a:buChar char="-"/>
+            </a:pPr>
+            <a:r>
               <a:rPr lang="en-GB" b="0" i="0" dirty="0">
                 <a:solidFill>
                   <a:srgbClr val="BDC1C6"/>
@@ -2541,11 +2337,67 @@
                 <a:effectLst/>
                 <a:latin typeface="arial" panose="020B0604020202020204" pitchFamily="34" charset="0"/>
               </a:rPr>
-              <a:t>Concepts: </a:t>
-            </a:r>
-          </a:p>
-          <a:p>
-            <a:pPr marL="628650" lvl="1" indent="-171450">
+              <a:t>Deploy it anywhere - public or private, cloud or Kubernetes cluster</a:t>
+            </a:r>
+          </a:p>
+          <a:p>
+            <a:pPr marL="171450" indent="-171450">
+              <a:buFontTx/>
+              <a:buChar char="-"/>
+            </a:pPr>
+            <a:endParaRPr lang="en-GB" b="0" i="0" dirty="0">
+              <a:solidFill>
+                <a:srgbClr val="BDC1C6"/>
+              </a:solidFill>
+              <a:effectLst/>
+              <a:latin typeface="arial" panose="020B0604020202020204" pitchFamily="34" charset="0"/>
+            </a:endParaRPr>
+          </a:p>
+          <a:p>
+            <a:pPr marL="171450" indent="-171450">
+              <a:buFontTx/>
+              <a:buChar char="-"/>
+            </a:pPr>
+            <a:r>
+              <a:rPr lang="en-GB" dirty="0"/>
+              <a:t>Apache Brooklyn is built for agile deployment of applications across cloud and other targets, and real-time </a:t>
+            </a:r>
+            <a:r>
+              <a:rPr lang="en-GB" dirty="0">
+                <a:hlinkClick r:id="rId6" tooltip="Refers to the self-managing characteristics of distributed computing resources,&#10;adapting to unpredictable changes while hiding intrinsic complexity to&#10;operators and users."/>
+              </a:rPr>
+              <a:t>autonomic</a:t>
+            </a:r>
+            <a:r>
+              <a:rPr lang="en-GB" dirty="0"/>
+              <a:t> management. "</a:t>
+            </a:r>
+            <a:r>
+              <a:rPr lang="en-GB" dirty="0">
+                <a:hlinkClick r:id="rId6" tooltip="Refers to the self-managing characteristics of distributed computing resources,&#10;adapting to unpredictable changes while hiding intrinsic complexity to&#10;operators and users."/>
+              </a:rPr>
+              <a:t>Autonomic</a:t>
+            </a:r>
+            <a:r>
+              <a:rPr lang="en-GB" dirty="0"/>
+              <a:t> computing" is the concept of components looking after themselves where possible (self-healing, self-optimizing, etc).</a:t>
+            </a:r>
+          </a:p>
+          <a:p>
+            <a:pPr marL="171450" indent="-171450">
+              <a:buFontTx/>
+              <a:buChar char="-"/>
+            </a:pPr>
+            <a:endParaRPr lang="en-GB" b="0" i="0" dirty="0">
+              <a:solidFill>
+                <a:srgbClr val="BDC1C6"/>
+              </a:solidFill>
+              <a:effectLst/>
+              <a:latin typeface="arial" panose="020B0604020202020204" pitchFamily="34" charset="0"/>
+            </a:endParaRPr>
+          </a:p>
+          <a:p>
+            <a:pPr marL="171450" indent="-171450">
               <a:buFontTx/>
               <a:buChar char="-"/>
             </a:pPr>
@@ -2557,67 +2409,18 @@
                 <a:effectLst/>
                 <a:latin typeface="arial" panose="020B0604020202020204" pitchFamily="34" charset="0"/>
               </a:rPr>
-              <a:t>Blueprints – descriptor or patterns telling Apache Brooklyn how applications should be deployed. Written in a YAML specification called CAMP -  </a:t>
-            </a:r>
-            <a:r>
-              <a:rPr lang="en-GB" b="1" i="1" dirty="0"/>
-              <a:t>C</a:t>
-            </a:r>
-            <a:r>
-              <a:rPr lang="en-GB" i="1" dirty="0"/>
-              <a:t>loud </a:t>
-            </a:r>
-            <a:r>
-              <a:rPr lang="en-GB" b="1" i="1" dirty="0"/>
-              <a:t>A</a:t>
-            </a:r>
-            <a:r>
-              <a:rPr lang="en-GB" i="1" dirty="0"/>
-              <a:t>pplication </a:t>
-            </a:r>
-            <a:r>
-              <a:rPr lang="en-GB" b="1" i="1" dirty="0"/>
-              <a:t>M</a:t>
-            </a:r>
-            <a:r>
-              <a:rPr lang="en-GB" i="1" dirty="0"/>
-              <a:t>anagement for </a:t>
-            </a:r>
-            <a:r>
-              <a:rPr lang="en-GB" b="1" i="1" dirty="0"/>
-              <a:t>P</a:t>
-            </a:r>
-            <a:r>
-              <a:rPr lang="en-GB" i="1" dirty="0"/>
-              <a:t>latforms (</a:t>
-            </a:r>
-            <a:r>
-              <a:rPr lang="en-GB" dirty="0"/>
-              <a:t>CAMP)  - also supports DSL expressions to link your components together in various ways. The </a:t>
-            </a:r>
-            <a:r>
-              <a:rPr lang="en-GB" dirty="0">
-                <a:hlinkClick r:id="rId3" tooltip="A description of an application or system, which can be used for its automated&#10;deployment and runtime management. The blueprint describes a model of the&#10;application (i.e. its components, their configuration, and their&#10;relationships), along with policies for runtime management. The blueprint can&#10;be described in YAML or Java."/>
+              <a:t>Basically, Apache Brooklyn is a </a:t>
+            </a:r>
+            <a:r>
+              <a:rPr lang="en-GB" b="0" i="0" dirty="0" err="1">
+                <a:solidFill>
+                  <a:srgbClr val="BDC1C6"/>
+                </a:solidFill>
+                <a:effectLst/>
+                <a:latin typeface="arial" panose="020B0604020202020204" pitchFamily="34" charset="0"/>
               </a:rPr>
-              <a:t>blueprint</a:t>
-            </a:r>
-            <a:r>
-              <a:rPr lang="en-GB" dirty="0"/>
-              <a:t> also specifies the inter-relationships between the configurations of the components.</a:t>
-            </a:r>
-            <a:endParaRPr lang="en-GB" b="0" i="0" dirty="0">
-              <a:solidFill>
-                <a:srgbClr val="BDC1C6"/>
-              </a:solidFill>
-              <a:effectLst/>
-              <a:latin typeface="arial" panose="020B0604020202020204" pitchFamily="34" charset="0"/>
-            </a:endParaRPr>
-          </a:p>
-          <a:p>
-            <a:pPr marL="628650" lvl="1" indent="-171450">
-              <a:buFontTx/>
-              <a:buChar char="-"/>
-            </a:pPr>
+              <a:t>swiss</a:t>
+            </a:r>
             <a:r>
               <a:rPr lang="en-GB" b="0" i="0" dirty="0">
                 <a:solidFill>
@@ -2626,7 +2429,23 @@
                 <a:effectLst/>
                 <a:latin typeface="arial" panose="020B0604020202020204" pitchFamily="34" charset="0"/>
               </a:rPr>
-              <a:t>Locations: used to configure the cloud where your entities are deployed, and all the properties specific to that cloud provider. Or cluster – because a location can point to a </a:t>
+              <a:t> army knife – helps you easily model your cloud application, deploy it, monitor it and if used right it can keep your application available at all times. </a:t>
+            </a:r>
+          </a:p>
+          <a:p>
+            <a:pPr marL="171450" indent="-171450">
+              <a:buFontTx/>
+              <a:buChar char="-"/>
+            </a:pPr>
+            <a:r>
+              <a:rPr lang="en-GB" b="0" i="0" dirty="0">
+                <a:solidFill>
+                  <a:srgbClr val="BDC1C6"/>
+                </a:solidFill>
+                <a:effectLst/>
+                <a:latin typeface="arial" panose="020B0604020202020204" pitchFamily="34" charset="0"/>
+              </a:rPr>
+              <a:t>But two things that I keep telling </a:t>
             </a:r>
             <a:r>
               <a:rPr lang="en-GB" b="0" i="0" dirty="0" err="1">
@@ -2636,7 +2455,7 @@
                 <a:effectLst/>
                 <a:latin typeface="arial" panose="020B0604020202020204" pitchFamily="34" charset="0"/>
               </a:rPr>
-              <a:t>Kuberbetes</a:t>
+              <a:t>Cloudsoft</a:t>
             </a:r>
             <a:r>
               <a:rPr lang="en-GB" b="0" i="0" dirty="0">
@@ -2646,7 +2465,7 @@
                 <a:effectLst/>
                 <a:latin typeface="arial" panose="020B0604020202020204" pitchFamily="34" charset="0"/>
               </a:rPr>
-              <a:t> or vSphere cluster</a:t>
+              <a:t>  they should brag more about Apache Brooklyn:</a:t>
             </a:r>
           </a:p>
           <a:p>
@@ -2662,53 +2481,8 @@
                 <a:effectLst/>
                 <a:latin typeface="arial" panose="020B0604020202020204" pitchFamily="34" charset="0"/>
               </a:rPr>
-              <a:t>Entities – a resource managed by Apache Brooklyn, every entity has a single parent entity called Application. </a:t>
-            </a:r>
-            <a:r>
-              <a:rPr lang="en-GB" dirty="0"/>
-              <a:t>An </a:t>
-            </a:r>
-            <a:r>
-              <a:rPr lang="en-GB" dirty="0">
-                <a:hlinkClick r:id="rId4" tooltip="A component of an application or system. This could be a physical component, a&#10;service, a grouping of components, or a logical construct describing part of an&#10;application/system. It is a &quot;managed element&quot; in autonomic computing parlance."/>
-              </a:rPr>
-              <a:t>entity</a:t>
-            </a:r>
-            <a:r>
-              <a:rPr lang="en-GB" dirty="0"/>
-              <a:t> represents a resource under management (individual machines or software processes) or logical collections of these. Entities are arranged hierarchically. A number of common entity types are available in the Brooklyn </a:t>
-            </a:r>
-            <a:r>
-              <a:rPr lang="en-GB" dirty="0" err="1"/>
-              <a:t>catalog</a:t>
-            </a:r>
-            <a:r>
-              <a:rPr lang="en-GB" dirty="0"/>
-              <a:t> -&gt; </a:t>
-            </a:r>
-            <a:r>
-              <a:rPr lang="en-GB" dirty="0" err="1"/>
-              <a:t>eg.</a:t>
-            </a:r>
-            <a:r>
-              <a:rPr lang="en-GB" dirty="0"/>
-              <a:t> – Apache Tomcat server, various databases, etc. You can write your own in Java or any other language and add them to the </a:t>
-            </a:r>
-            <a:r>
-              <a:rPr lang="en-GB" dirty="0" err="1"/>
-              <a:t>catalog</a:t>
-            </a:r>
-            <a:r>
-              <a:rPr lang="en-GB" dirty="0"/>
-              <a:t>. </a:t>
-            </a:r>
-            <a:endParaRPr lang="en-GB" b="0" i="0" dirty="0">
-              <a:solidFill>
-                <a:srgbClr val="BDC1C6"/>
-              </a:solidFill>
-              <a:effectLst/>
-              <a:latin typeface="arial" panose="020B0604020202020204" pitchFamily="34" charset="0"/>
-            </a:endParaRPr>
+              <a:t>Avoid cloud costs during development</a:t>
+            </a:r>
           </a:p>
           <a:p>
             <a:pPr marL="628650" lvl="1" indent="-171450">
@@ -2723,25 +2497,18 @@
                 <a:effectLst/>
                 <a:latin typeface="arial" panose="020B0604020202020204" pitchFamily="34" charset="0"/>
               </a:rPr>
-              <a:t>Sensors - </a:t>
-            </a:r>
-            <a:r>
-              <a:rPr lang="en-GB" dirty="0"/>
-              <a:t>(activity information and notifications)</a:t>
-            </a:r>
-            <a:endParaRPr lang="en-GB" b="0" i="0" dirty="0">
-              <a:solidFill>
-                <a:srgbClr val="BDC1C6"/>
-              </a:solidFill>
-              <a:effectLst/>
-              <a:latin typeface="arial" panose="020B0604020202020204" pitchFamily="34" charset="0"/>
-            </a:endParaRPr>
-          </a:p>
-          <a:p>
-            <a:pPr marL="628650" lvl="1" indent="-171450">
-              <a:buFontTx/>
-              <a:buChar char="-"/>
-            </a:pPr>
+              <a:t>Relaxing the tie you have with your cloud provider -&gt; example: if your application does not use specific cloud services like lambda functions -&gt; e.g. it just represented by a bunch of services that can be installed on any VM, or a bunch of containers that can be run in any </a:t>
+            </a:r>
+            <a:r>
+              <a:rPr lang="en-GB" b="0" i="0" dirty="0" err="1">
+                <a:solidFill>
+                  <a:srgbClr val="BDC1C6"/>
+                </a:solidFill>
+                <a:effectLst/>
+                <a:latin typeface="arial" panose="020B0604020202020204" pitchFamily="34" charset="0"/>
+              </a:rPr>
+              <a:t>Kubernets</a:t>
+            </a:r>
             <a:r>
               <a:rPr lang="en-GB" b="0" i="0" dirty="0">
                 <a:solidFill>
@@ -2750,76 +2517,8 @@
                 <a:effectLst/>
                 <a:latin typeface="arial" panose="020B0604020202020204" pitchFamily="34" charset="0"/>
               </a:rPr>
-              <a:t>Effectors - </a:t>
-            </a:r>
-            <a:r>
-              <a:rPr lang="en-GB" dirty="0"/>
-              <a:t>(operations that can be invoked on the </a:t>
-            </a:r>
-            <a:r>
-              <a:rPr lang="en-GB" dirty="0">
-                <a:hlinkClick r:id="rId4" tooltip="A component of an application or system. This could be a physical component, a&#10;service, a grouping of components, or a logical construct describing part of an&#10;application/system. It is a &quot;managed element&quot; in autonomic computing parlance."/>
-              </a:rPr>
-              <a:t>entity</a:t>
-            </a:r>
-            <a:r>
-              <a:rPr lang="en-GB" dirty="0"/>
-              <a:t>) </a:t>
-            </a:r>
-            <a:endParaRPr lang="en-GB" b="0" i="0" dirty="0">
-              <a:solidFill>
-                <a:srgbClr val="BDC1C6"/>
-              </a:solidFill>
-              <a:effectLst/>
-              <a:latin typeface="arial" panose="020B0604020202020204" pitchFamily="34" charset="0"/>
-            </a:endParaRPr>
-          </a:p>
-          <a:p>
-            <a:pPr marL="628650" lvl="1" indent="-171450">
-              <a:buFontTx/>
-              <a:buChar char="-"/>
-            </a:pPr>
-            <a:r>
-              <a:rPr lang="en-GB" b="0" i="0" dirty="0">
-                <a:solidFill>
-                  <a:srgbClr val="BDC1C6"/>
-                </a:solidFill>
-                <a:effectLst/>
-                <a:latin typeface="arial" panose="020B0604020202020204" pitchFamily="34" charset="0"/>
-              </a:rPr>
-              <a:t>Policies - </a:t>
-            </a:r>
-            <a:r>
-              <a:rPr lang="en-GB" dirty="0"/>
-              <a:t>perform the active management enabled by Brooklyn. Policies can subscribe to sensors from entities or run periodically, and when they run they can perform calculations, look up other values, and if deemed necessary invoke effectors or emit </a:t>
-            </a:r>
-            <a:r>
-              <a:rPr lang="en-GB" dirty="0">
-                <a:hlinkClick r:id="rId5" tooltip="A sensor is a property, or attribute of an Apache Brooklyn entity, updated in real-time."/>
-              </a:rPr>
-              <a:t>sensor</a:t>
-            </a:r>
-            <a:r>
-              <a:rPr lang="en-GB" dirty="0"/>
-              <a:t> values from the </a:t>
-            </a:r>
-            <a:r>
-              <a:rPr lang="en-GB" dirty="0">
-                <a:hlinkClick r:id="rId4" tooltip="A component of an application or system. This could be a physical component, a&#10;service, a grouping of components, or a logical construct describing part of an&#10;application/system. It is a &quot;managed element&quot; in autonomic computing parlance."/>
-              </a:rPr>
-              <a:t>entity</a:t>
-            </a:r>
-            <a:r>
-              <a:rPr lang="en-GB" dirty="0"/>
-              <a:t> with which they are associated. – use an an example an auto-scaling policy</a:t>
-            </a:r>
-            <a:endParaRPr lang="en-US" b="0" i="0" dirty="0">
-              <a:solidFill>
-                <a:srgbClr val="BDC1C6"/>
-              </a:solidFill>
-              <a:effectLst/>
-              <a:latin typeface="arial" panose="020B0604020202020204" pitchFamily="34" charset="0"/>
-            </a:endParaRPr>
+              <a:t> cluster, you can use the same CAMP configuration, change the location in Apache Brooklyn and deploy it in the new cloud of your choice.  You still have to do some work if you want to move data from a database to another, but oh well…</a:t>
+            </a:r>
           </a:p>
         </p:txBody>
       </p:sp>
@@ -2840,7 +2539,7 @@
           <a:p>
             <a:fld id="{D62F27D6-02B0-9E4F-9688-CC4BB499F553}" type="slidenum">
               <a:rPr lang="en-US" smtClean="0"/>
-              <a:t>9</a:t>
+              <a:t>8</a:t>
             </a:fld>
             <a:endParaRPr lang="en-US"/>
           </a:p>
@@ -2849,7 +2548,7 @@
     </p:spTree>
     <p:extLst>
       <p:ext uri="{BB962C8B-B14F-4D97-AF65-F5344CB8AC3E}">
-        <p14:creationId xmlns:p14="http://schemas.microsoft.com/office/powerpoint/2010/main" val="172814221"/>
+        <p14:creationId xmlns:p14="http://schemas.microsoft.com/office/powerpoint/2010/main" val="1738113888"/>
       </p:ext>
     </p:extLst>
   </p:cSld>
@@ -2905,73 +2604,359 @@
           <a:p>
             <a:r>
               <a:rPr lang="en-US" dirty="0"/>
-              <a:t>SSH mode: Basically Apache Brooklyn </a:t>
-            </a:r>
-            <a:r>
-              <a:rPr lang="en-US" dirty="0" err="1"/>
-              <a:t>ssh</a:t>
-            </a:r>
-            <a:r>
-              <a:rPr lang="en-US" dirty="0"/>
-              <a:t>-es into VM and installs there what you tell it to install.</a:t>
-            </a:r>
-          </a:p>
-          <a:p>
-            <a:endParaRPr lang="en-US" dirty="0"/>
-          </a:p>
-          <a:p>
-            <a:r>
-              <a:rPr lang="en-US" dirty="0"/>
-              <a:t>For AWS cloud the module the library that support remote manipulation of resources is named </a:t>
-            </a:r>
-            <a:r>
-              <a:rPr lang="en-US" dirty="0" err="1"/>
-              <a:t>JClouds</a:t>
-            </a:r>
-            <a:r>
-              <a:rPr lang="en-US" dirty="0"/>
+              <a:t>Apache Brooklyn is an open-source software for creation, </a:t>
+            </a:r>
+            <a:r>
+              <a:rPr lang="en-GB" b="0" i="0" dirty="0">
+                <a:solidFill>
+                  <a:srgbClr val="BDC1C6"/>
+                </a:solidFill>
+                <a:effectLst/>
+                <a:latin typeface="arial" panose="020B0604020202020204" pitchFamily="34" charset="0"/>
+              </a:rPr>
+              <a:t>management and destruction of cloud resources – infrastructure and code. Thus, this makes it a </a:t>
+            </a:r>
+            <a:r>
+              <a:rPr lang="en-GB" b="1" i="0" dirty="0">
+                <a:solidFill>
+                  <a:srgbClr val="BDC1C6"/>
+                </a:solidFill>
+                <a:effectLst/>
+                <a:latin typeface="arial" panose="020B0604020202020204" pitchFamily="34" charset="0"/>
+              </a:rPr>
+              <a:t>cloud orchestration software</a:t>
+            </a:r>
+            <a:r>
+              <a:rPr lang="en-GB" b="0" i="0" dirty="0">
+                <a:solidFill>
+                  <a:srgbClr val="BDC1C6"/>
+                </a:solidFill>
+                <a:effectLst/>
+                <a:latin typeface="arial" panose="020B0604020202020204" pitchFamily="34" charset="0"/>
+              </a:rPr>
               <a:t>. </a:t>
             </a:r>
           </a:p>
           <a:p>
-            <a:endParaRPr lang="en-US" dirty="0"/>
-          </a:p>
-          <a:p>
-            <a:r>
-              <a:rPr lang="en-US" dirty="0"/>
-              <a:t>The terraform module – provides a few types for the catalog that allow Apache Brooklyn to interact with terraform on your behalf. You don’t have to touch the CLI anymore, and Apache Brooklyn renders the  resources state via various sensors… and you can add your own.  I don’t want to brag but I worked on it, and had a blast writing the code. </a:t>
-            </a:r>
-          </a:p>
-          <a:p>
-            <a:r>
-              <a:rPr lang="en-US" dirty="0"/>
-              <a:t>The advantage of this module is that you can actually import an existing terraform deployment into Apache Brooklyn. </a:t>
-            </a:r>
-          </a:p>
-          <a:p>
-            <a:endParaRPr lang="en-US" dirty="0"/>
-          </a:p>
-          <a:p>
-            <a:r>
-              <a:rPr lang="en-US" dirty="0"/>
-              <a:t>We have a Kubernetes module - provides a few types for the catalog that allow Apache Brooklyn to interact with </a:t>
-            </a:r>
-            <a:r>
-              <a:rPr lang="en-US" dirty="0" err="1"/>
-              <a:t>kubectl</a:t>
-            </a:r>
-            <a:r>
-              <a:rPr lang="en-US" dirty="0"/>
-              <a:t>  on your behalf and deploy and monitor applications </a:t>
-            </a:r>
-            <a:r>
-              <a:rPr lang="en-US" dirty="0" err="1"/>
-              <a:t>ona</a:t>
-            </a:r>
-            <a:r>
-              <a:rPr lang="en-US" dirty="0"/>
-              <a:t> Kubernetes cluster</a:t>
-            </a:r>
+            <a:r>
+              <a:rPr lang="en-GB" b="0" i="0" dirty="0">
+                <a:solidFill>
+                  <a:srgbClr val="BDC1C6"/>
+                </a:solidFill>
+                <a:effectLst/>
+                <a:latin typeface="arial" panose="020B0604020202020204" pitchFamily="34" charset="0"/>
+              </a:rPr>
+              <a:t>TODO – </a:t>
+            </a:r>
+          </a:p>
+          <a:p>
+            <a:pPr marL="171450" indent="-171450">
+              <a:buFontTx/>
+              <a:buChar char="-"/>
+            </a:pPr>
+            <a:r>
+              <a:rPr lang="en-GB" b="0" i="0" dirty="0">
+                <a:solidFill>
+                  <a:srgbClr val="BDC1C6"/>
+                </a:solidFill>
+                <a:effectLst/>
+                <a:latin typeface="arial" panose="020B0604020202020204" pitchFamily="34" charset="0"/>
+              </a:rPr>
+              <a:t>Mention CAMP + types + DSL</a:t>
+            </a:r>
+          </a:p>
+          <a:p>
+            <a:pPr marL="171450" indent="-171450">
+              <a:buFontTx/>
+              <a:buChar char="-"/>
+            </a:pPr>
+            <a:r>
+              <a:rPr lang="en-GB" b="0" i="0" dirty="0">
+                <a:solidFill>
+                  <a:srgbClr val="BDC1C6"/>
+                </a:solidFill>
+                <a:effectLst/>
+                <a:latin typeface="arial" panose="020B0604020202020204" pitchFamily="34" charset="0"/>
+              </a:rPr>
+              <a:t>Concepts: </a:t>
+            </a:r>
+          </a:p>
+          <a:p>
+            <a:pPr marL="628650" lvl="1" indent="-171450">
+              <a:buFontTx/>
+              <a:buChar char="-"/>
+            </a:pPr>
+            <a:r>
+              <a:rPr lang="en-GB" b="0" i="0" dirty="0">
+                <a:solidFill>
+                  <a:srgbClr val="BDC1C6"/>
+                </a:solidFill>
+                <a:effectLst/>
+                <a:latin typeface="arial" panose="020B0604020202020204" pitchFamily="34" charset="0"/>
+              </a:rPr>
+              <a:t>Blueprints – descriptor or patterns telling Apache Brooklyn how applications should be deployed. Written in a YAML specification called CAMP -  </a:t>
+            </a:r>
+            <a:r>
+              <a:rPr lang="en-GB" b="1" i="1" dirty="0"/>
+              <a:t>C</a:t>
+            </a:r>
+            <a:r>
+              <a:rPr lang="en-GB" i="1" dirty="0"/>
+              <a:t>loud </a:t>
+            </a:r>
+            <a:r>
+              <a:rPr lang="en-GB" b="1" i="1" dirty="0"/>
+              <a:t>A</a:t>
+            </a:r>
+            <a:r>
+              <a:rPr lang="en-GB" i="1" dirty="0"/>
+              <a:t>pplication </a:t>
+            </a:r>
+            <a:r>
+              <a:rPr lang="en-GB" b="1" i="1" dirty="0"/>
+              <a:t>M</a:t>
+            </a:r>
+            <a:r>
+              <a:rPr lang="en-GB" i="1" dirty="0"/>
+              <a:t>anagement for </a:t>
+            </a:r>
+            <a:r>
+              <a:rPr lang="en-GB" b="1" i="1" dirty="0"/>
+              <a:t>P</a:t>
+            </a:r>
+            <a:r>
+              <a:rPr lang="en-GB" i="1" dirty="0"/>
+              <a:t>latforms (</a:t>
+            </a:r>
+            <a:r>
+              <a:rPr lang="en-GB" dirty="0"/>
+              <a:t>CAMP)  - also supports DSL expressions to link your components together in various ways. The </a:t>
+            </a:r>
+            <a:r>
+              <a:rPr lang="en-GB" dirty="0">
+                <a:hlinkClick r:id="rId3" tooltip="A description of an application or system, which can be used for its automated&#10;deployment and runtime management. The blueprint describes a model of the&#10;application (i.e. its components, their configuration, and their&#10;relationships), along with policies for runtime management. The blueprint can&#10;be described in YAML or Java."/>
+              </a:rPr>
+              <a:t>blueprint</a:t>
+            </a:r>
+            <a:r>
+              <a:rPr lang="en-GB" dirty="0"/>
+              <a:t> also specifies the inter-relationships between the configurations of the components.</a:t>
+            </a:r>
+            <a:endParaRPr lang="en-GB" b="0" i="0" dirty="0">
+              <a:solidFill>
+                <a:srgbClr val="BDC1C6"/>
+              </a:solidFill>
+              <a:effectLst/>
+              <a:latin typeface="arial" panose="020B0604020202020204" pitchFamily="34" charset="0"/>
+            </a:endParaRPr>
+          </a:p>
+          <a:p>
+            <a:pPr marL="628650" lvl="1" indent="-171450">
+              <a:buFontTx/>
+              <a:buChar char="-"/>
+            </a:pPr>
+            <a:r>
+              <a:rPr lang="en-GB" b="0" i="0" dirty="0">
+                <a:solidFill>
+                  <a:srgbClr val="BDC1C6"/>
+                </a:solidFill>
+                <a:effectLst/>
+                <a:latin typeface="arial" panose="020B0604020202020204" pitchFamily="34" charset="0"/>
+              </a:rPr>
+              <a:t>Locations: used to configure the cloud where your entities are deployed, and all the properties specific to that cloud provider. Or cluster – because a location can point to a </a:t>
+            </a:r>
+            <a:r>
+              <a:rPr lang="en-GB" b="0" i="0" dirty="0" err="1">
+                <a:solidFill>
+                  <a:srgbClr val="BDC1C6"/>
+                </a:solidFill>
+                <a:effectLst/>
+                <a:latin typeface="arial" panose="020B0604020202020204" pitchFamily="34" charset="0"/>
+              </a:rPr>
+              <a:t>Kuberbetes</a:t>
+            </a:r>
+            <a:r>
+              <a:rPr lang="en-GB" b="0" i="0" dirty="0">
+                <a:solidFill>
+                  <a:srgbClr val="BDC1C6"/>
+                </a:solidFill>
+                <a:effectLst/>
+                <a:latin typeface="arial" panose="020B0604020202020204" pitchFamily="34" charset="0"/>
+              </a:rPr>
+              <a:t> or vSphere cluster</a:t>
+            </a:r>
+          </a:p>
+          <a:p>
+            <a:pPr marL="628650" lvl="1" indent="-171450">
+              <a:buFontTx/>
+              <a:buChar char="-"/>
+            </a:pPr>
+            <a:r>
+              <a:rPr lang="en-GB" b="0" i="0" dirty="0">
+                <a:solidFill>
+                  <a:srgbClr val="BDC1C6"/>
+                </a:solidFill>
+                <a:effectLst/>
+                <a:latin typeface="arial" panose="020B0604020202020204" pitchFamily="34" charset="0"/>
+              </a:rPr>
+              <a:t>Entities – a resource managed by Apache Brooklyn, every entity has a single parent entity called Application. </a:t>
+            </a:r>
+            <a:r>
+              <a:rPr lang="en-GB" dirty="0"/>
+              <a:t>An </a:t>
+            </a:r>
+            <a:r>
+              <a:rPr lang="en-GB" dirty="0">
+                <a:hlinkClick r:id="rId4" tooltip="A component of an application or system. This could be a physical component, a&#10;service, a grouping of components, or a logical construct describing part of an&#10;application/system. It is a &quot;managed element&quot; in autonomic computing parlance."/>
+              </a:rPr>
+              <a:t>entity</a:t>
+            </a:r>
+            <a:r>
+              <a:rPr lang="en-GB" dirty="0"/>
+              <a:t> represents a resource under management (individual machines or software processes) or logical collections of these. Entities are arranged hierarchically. A number of common entity types are available in the Brooklyn </a:t>
+            </a:r>
+            <a:r>
+              <a:rPr lang="en-GB" dirty="0" err="1"/>
+              <a:t>catalog</a:t>
+            </a:r>
+            <a:r>
+              <a:rPr lang="en-GB" dirty="0"/>
+              <a:t> -&gt; </a:t>
+            </a:r>
+            <a:r>
+              <a:rPr lang="en-GB" dirty="0" err="1"/>
+              <a:t>eg.</a:t>
+            </a:r>
+            <a:r>
+              <a:rPr lang="en-GB" dirty="0"/>
+              <a:t> – Apache Tomcat server, various databases, etc. You can write your own in Java or any other language and add them to the </a:t>
+            </a:r>
+            <a:r>
+              <a:rPr lang="en-GB" dirty="0" err="1"/>
+              <a:t>catalog</a:t>
+            </a:r>
+            <a:r>
+              <a:rPr lang="en-GB" dirty="0"/>
+              <a:t>. </a:t>
+            </a:r>
+            <a:endParaRPr lang="en-GB" b="0" i="0" dirty="0">
+              <a:solidFill>
+                <a:srgbClr val="BDC1C6"/>
+              </a:solidFill>
+              <a:effectLst/>
+              <a:latin typeface="arial" panose="020B0604020202020204" pitchFamily="34" charset="0"/>
+            </a:endParaRPr>
+          </a:p>
+          <a:p>
+            <a:pPr marL="628650" lvl="1" indent="-171450">
+              <a:buFontTx/>
+              <a:buChar char="-"/>
+            </a:pPr>
+            <a:r>
+              <a:rPr lang="en-GB" b="0" i="0" dirty="0">
+                <a:solidFill>
+                  <a:srgbClr val="BDC1C6"/>
+                </a:solidFill>
+                <a:effectLst/>
+                <a:latin typeface="arial" panose="020B0604020202020204" pitchFamily="34" charset="0"/>
+              </a:rPr>
+              <a:t>Sensors - </a:t>
+            </a:r>
+            <a:r>
+              <a:rPr lang="en-GB" dirty="0"/>
+              <a:t>(activity information and notifications)</a:t>
+            </a:r>
+            <a:endParaRPr lang="en-GB" b="0" i="0" dirty="0">
+              <a:solidFill>
+                <a:srgbClr val="BDC1C6"/>
+              </a:solidFill>
+              <a:effectLst/>
+              <a:latin typeface="arial" panose="020B0604020202020204" pitchFamily="34" charset="0"/>
+            </a:endParaRPr>
+          </a:p>
+          <a:p>
+            <a:pPr marL="628650" lvl="1" indent="-171450">
+              <a:buFontTx/>
+              <a:buChar char="-"/>
+            </a:pPr>
+            <a:r>
+              <a:rPr lang="en-GB" b="0" i="0" dirty="0">
+                <a:solidFill>
+                  <a:srgbClr val="BDC1C6"/>
+                </a:solidFill>
+                <a:effectLst/>
+                <a:latin typeface="arial" panose="020B0604020202020204" pitchFamily="34" charset="0"/>
+              </a:rPr>
+              <a:t>Effectors - </a:t>
+            </a:r>
+            <a:r>
+              <a:rPr lang="en-GB" dirty="0"/>
+              <a:t>(operations that can be invoked on the </a:t>
+            </a:r>
+            <a:r>
+              <a:rPr lang="en-GB" dirty="0">
+                <a:hlinkClick r:id="rId4" tooltip="A component of an application or system. This could be a physical component, a&#10;service, a grouping of components, or a logical construct describing part of an&#10;application/system. It is a &quot;managed element&quot; in autonomic computing parlance."/>
+              </a:rPr>
+              <a:t>entity</a:t>
+            </a:r>
+            <a:r>
+              <a:rPr lang="en-GB" dirty="0"/>
+              <a:t>) </a:t>
+            </a:r>
+            <a:endParaRPr lang="en-GB" b="0" i="0" dirty="0">
+              <a:solidFill>
+                <a:srgbClr val="BDC1C6"/>
+              </a:solidFill>
+              <a:effectLst/>
+              <a:latin typeface="arial" panose="020B0604020202020204" pitchFamily="34" charset="0"/>
+            </a:endParaRPr>
+          </a:p>
+          <a:p>
+            <a:pPr marL="628650" lvl="1" indent="-171450">
+              <a:buFontTx/>
+              <a:buChar char="-"/>
+            </a:pPr>
+            <a:r>
+              <a:rPr lang="en-GB" b="0" i="0" dirty="0">
+                <a:solidFill>
+                  <a:srgbClr val="BDC1C6"/>
+                </a:solidFill>
+                <a:effectLst/>
+                <a:latin typeface="arial" panose="020B0604020202020204" pitchFamily="34" charset="0"/>
+              </a:rPr>
+              <a:t>Policies - </a:t>
+            </a:r>
+            <a:r>
+              <a:rPr lang="en-GB" dirty="0"/>
+              <a:t>perform the active management enabled by Brooklyn. Policies can subscribe to sensors from entities or run periodically, and when they run they can perform calculations, look up other values, and if deemed necessary invoke effectors or emit </a:t>
+            </a:r>
+            <a:r>
+              <a:rPr lang="en-GB" dirty="0">
+                <a:hlinkClick r:id="rId5" tooltip="A sensor is a property, or attribute of an Apache Brooklyn entity, updated in real-time."/>
+              </a:rPr>
+              <a:t>sensor</a:t>
+            </a:r>
+            <a:r>
+              <a:rPr lang="en-GB" dirty="0"/>
+              <a:t> values from the </a:t>
+            </a:r>
+            <a:r>
+              <a:rPr lang="en-GB" dirty="0">
+                <a:hlinkClick r:id="rId4" tooltip="A component of an application or system. This could be a physical component, a&#10;service, a grouping of components, or a logical construct describing part of an&#10;application/system. It is a &quot;managed element&quot; in autonomic computing parlance."/>
+              </a:rPr>
+              <a:t>entity</a:t>
+            </a:r>
+            <a:r>
+              <a:rPr lang="en-GB" dirty="0"/>
+              <a:t> with which they are associated. – use an an example an auto-scaling policy</a:t>
+            </a:r>
+            <a:endParaRPr lang="en-US" b="0" i="0" dirty="0">
+              <a:solidFill>
+                <a:srgbClr val="BDC1C6"/>
+              </a:solidFill>
+              <a:effectLst/>
+              <a:latin typeface="arial" panose="020B0604020202020204" pitchFamily="34" charset="0"/>
+            </a:endParaRPr>
           </a:p>
         </p:txBody>
       </p:sp>
@@ -2992,7 +2977,7 @@
           <a:p>
             <a:fld id="{D62F27D6-02B0-9E4F-9688-CC4BB499F553}" type="slidenum">
               <a:rPr lang="en-US" smtClean="0"/>
-              <a:t>10</a:t>
+              <a:t>9</a:t>
             </a:fld>
             <a:endParaRPr lang="en-US"/>
           </a:p>
@@ -3001,7 +2986,7 @@
     </p:spTree>
     <p:extLst>
       <p:ext uri="{BB962C8B-B14F-4D97-AF65-F5344CB8AC3E}">
-        <p14:creationId xmlns:p14="http://schemas.microsoft.com/office/powerpoint/2010/main" val="3148425993"/>
+        <p14:creationId xmlns:p14="http://schemas.microsoft.com/office/powerpoint/2010/main" val="172814221"/>
       </p:ext>
     </p:extLst>
   </p:cSld>
@@ -3055,7 +3040,75 @@
           <a:bodyPr/>
           <a:lstStyle/>
           <a:p>
+            <a:r>
+              <a:rPr lang="en-US" dirty="0"/>
+              <a:t>SSH mode: Basically Apache Brooklyn </a:t>
+            </a:r>
+            <a:r>
+              <a:rPr lang="en-US" dirty="0" err="1"/>
+              <a:t>ssh</a:t>
+            </a:r>
+            <a:r>
+              <a:rPr lang="en-US" dirty="0"/>
+              <a:t>-es into VM and installs there what you tell it to install.</a:t>
+            </a:r>
+          </a:p>
+          <a:p>
             <a:endParaRPr lang="en-US" dirty="0"/>
+          </a:p>
+          <a:p>
+            <a:r>
+              <a:rPr lang="en-US" dirty="0"/>
+              <a:t>For AWS cloud the module the library that support remote manipulation of resources is named </a:t>
+            </a:r>
+            <a:r>
+              <a:rPr lang="en-US" dirty="0" err="1"/>
+              <a:t>JClouds</a:t>
+            </a:r>
+            <a:r>
+              <a:rPr lang="en-US" dirty="0"/>
+              <a:t>. </a:t>
+            </a:r>
+          </a:p>
+          <a:p>
+            <a:endParaRPr lang="en-US" dirty="0"/>
+          </a:p>
+          <a:p>
+            <a:r>
+              <a:rPr lang="en-US" dirty="0"/>
+              <a:t>The terraform module – provides a few types for the catalog that allow Apache Brooklyn to interact with terraform on your behalf. You don’t have to touch the CLI anymore, and Apache Brooklyn renders the  resources state via various sensors… and you can add your own.  I don’t want to brag but I worked on it, and had a blast writing the code. </a:t>
+            </a:r>
+          </a:p>
+          <a:p>
+            <a:r>
+              <a:rPr lang="en-US" dirty="0"/>
+              <a:t>The advantage of this module is that you can actually import an existing terraform deployment into Apache Brooklyn. </a:t>
+            </a:r>
+          </a:p>
+          <a:p>
+            <a:endParaRPr lang="en-US" dirty="0"/>
+          </a:p>
+          <a:p>
+            <a:r>
+              <a:rPr lang="en-US" dirty="0"/>
+              <a:t>We have a Kubernetes module - provides a few types for the catalog that allow Apache Brooklyn to interact with </a:t>
+            </a:r>
+            <a:r>
+              <a:rPr lang="en-US" dirty="0" err="1"/>
+              <a:t>kubectl</a:t>
+            </a:r>
+            <a:r>
+              <a:rPr lang="en-US" dirty="0"/>
+              <a:t>  on your behalf and deploy and monitor applications </a:t>
+            </a:r>
+            <a:r>
+              <a:rPr lang="en-US" dirty="0" err="1"/>
+              <a:t>ona</a:t>
+            </a:r>
+            <a:r>
+              <a:rPr lang="en-US" dirty="0"/>
+              <a:t> Kubernetes cluster</a:t>
+            </a:r>
           </a:p>
         </p:txBody>
       </p:sp>
@@ -3076,7 +3129,7 @@
           <a:p>
             <a:fld id="{D62F27D6-02B0-9E4F-9688-CC4BB499F553}" type="slidenum">
               <a:rPr lang="en-US" smtClean="0"/>
-              <a:t>11</a:t>
+              <a:t>10</a:t>
             </a:fld>
             <a:endParaRPr lang="en-US"/>
           </a:p>
@@ -3085,7 +3138,7 @@
     </p:spTree>
     <p:extLst>
       <p:ext uri="{BB962C8B-B14F-4D97-AF65-F5344CB8AC3E}">
-        <p14:creationId xmlns:p14="http://schemas.microsoft.com/office/powerpoint/2010/main" val="1379151011"/>
+        <p14:creationId xmlns:p14="http://schemas.microsoft.com/office/powerpoint/2010/main" val="3148425993"/>
       </p:ext>
     </p:extLst>
   </p:cSld>
@@ -3139,18 +3192,7 @@
           <a:bodyPr/>
           <a:lstStyle/>
           <a:p>
-            <a:r>
-              <a:rPr lang="en-US" dirty="0"/>
-              <a:t>Yes, I added a native Spring Boot App, running on </a:t>
-            </a:r>
-            <a:r>
-              <a:rPr lang="en-US" dirty="0" err="1"/>
-              <a:t>GraalVM</a:t>
-            </a:r>
-            <a:r>
-              <a:rPr lang="en-US" dirty="0"/>
-              <a:t> because this is the hype right now, and I have to write about it in my latest book.  </a:t>
-            </a:r>
+            <a:endParaRPr lang="en-US" dirty="0"/>
           </a:p>
         </p:txBody>
       </p:sp>
@@ -3171,7 +3213,7 @@
           <a:p>
             <a:fld id="{D62F27D6-02B0-9E4F-9688-CC4BB499F553}" type="slidenum">
               <a:rPr lang="en-US" smtClean="0"/>
-              <a:t>12</a:t>
+              <a:t>11</a:t>
             </a:fld>
             <a:endParaRPr lang="en-US"/>
           </a:p>
@@ -3180,7 +3222,7 @@
     </p:spTree>
     <p:extLst>
       <p:ext uri="{BB962C8B-B14F-4D97-AF65-F5344CB8AC3E}">
-        <p14:creationId xmlns:p14="http://schemas.microsoft.com/office/powerpoint/2010/main" val="1957204630"/>
+        <p14:creationId xmlns:p14="http://schemas.microsoft.com/office/powerpoint/2010/main" val="1379151011"/>
       </p:ext>
     </p:extLst>
   </p:cSld>
@@ -13179,7 +13221,7 @@
             <a:avLst/>
           </a:prstGeom>
           <a:blipFill dpi="0" rotWithShape="1">
-            <a:blip r:embed="rId2">
+            <a:blip r:embed="rId3">
               <a:alphaModFix amt="6000"/>
             </a:blip>
             <a:srcRect/>
@@ -13262,7 +13304,7 @@
           <p:nvPr/>
         </p:nvPicPr>
         <p:blipFill>
-          <a:blip r:embed="rId3"/>
+          <a:blip r:embed="rId4"/>
           <a:stretch>
             <a:fillRect/>
           </a:stretch>
@@ -17451,122 +17493,6 @@
           <a:chExt cx="0" cy="0"/>
         </a:xfrm>
       </p:grpSpPr>
-      <p:sp>
-        <p:nvSpPr>
-          <p:cNvPr id="2" name="Title 1">
-            <a:extLst>
-              <a:ext uri="{FF2B5EF4-FFF2-40B4-BE49-F238E27FC236}">
-                <a16:creationId xmlns:a16="http://schemas.microsoft.com/office/drawing/2014/main" id="{DB840D9E-9197-F4B3-286E-AD7538074489}"/>
-              </a:ext>
-            </a:extLst>
-          </p:cNvPr>
-          <p:cNvSpPr>
-            <a:spLocks noGrp="1"/>
-          </p:cNvSpPr>
-          <p:nvPr>
-            <p:ph type="title"/>
-          </p:nvPr>
-        </p:nvSpPr>
-        <p:spPr/>
-        <p:txBody>
-          <a:bodyPr>
-            <a:normAutofit/>
-          </a:bodyPr>
-          <a:lstStyle/>
-          <a:p>
-            <a:r>
-              <a:rPr lang="en-US" sz="8000" dirty="0">
-                <a:latin typeface="ACADEMY ENGRAVED LET PLAIN:1.0" panose="02000000000000000000" pitchFamily="2" charset="0"/>
-              </a:rPr>
-              <a:t>Agenda</a:t>
-            </a:r>
-          </a:p>
-        </p:txBody>
-      </p:sp>
-      <p:sp>
-        <p:nvSpPr>
-          <p:cNvPr id="3" name="Content Placeholder 2">
-            <a:extLst>
-              <a:ext uri="{FF2B5EF4-FFF2-40B4-BE49-F238E27FC236}">
-                <a16:creationId xmlns:a16="http://schemas.microsoft.com/office/drawing/2014/main" id="{29A25413-0FC3-549D-EA34-D62AE226BA67}"/>
-              </a:ext>
-            </a:extLst>
-          </p:cNvPr>
-          <p:cNvSpPr>
-            <a:spLocks noGrp="1"/>
-          </p:cNvSpPr>
-          <p:nvPr>
-            <p:ph idx="1"/>
-          </p:nvPr>
-        </p:nvSpPr>
-        <p:spPr/>
-        <p:txBody>
-          <a:bodyPr>
-            <a:normAutofit/>
-          </a:bodyPr>
-          <a:lstStyle/>
-          <a:p>
-            <a:endParaRPr lang="en-US" sz="4000" dirty="0"/>
-          </a:p>
-          <a:p>
-            <a:r>
-              <a:rPr lang="en-US" sz="4000" dirty="0"/>
-              <a:t>Working on the Cloud</a:t>
-            </a:r>
-          </a:p>
-          <a:p>
-            <a:r>
-              <a:rPr lang="en-US" sz="4000" dirty="0"/>
-              <a:t>Apache Brooklyn</a:t>
-            </a:r>
-          </a:p>
-          <a:p>
-            <a:r>
-              <a:rPr lang="en-US" sz="4000" dirty="0"/>
-              <a:t>Demo Time!</a:t>
-            </a:r>
-          </a:p>
-          <a:p>
-            <a:r>
-              <a:rPr lang="en-US" sz="4000" dirty="0"/>
-              <a:t>Conclusions &amp; Questions</a:t>
-            </a:r>
-          </a:p>
-          <a:p>
-            <a:endParaRPr lang="en-US" dirty="0"/>
-          </a:p>
-        </p:txBody>
-      </p:sp>
-    </p:spTree>
-    <p:extLst>
-      <p:ext uri="{BB962C8B-B14F-4D97-AF65-F5344CB8AC3E}">
-        <p14:creationId xmlns:p14="http://schemas.microsoft.com/office/powerpoint/2010/main" val="2879295292"/>
-      </p:ext>
-    </p:extLst>
-  </p:cSld>
-  <p:clrMapOvr>
-    <a:masterClrMapping/>
-  </p:clrMapOvr>
-</p:sld>
-</file>
-
-<file path=ppt/slides/slide3.xml><?xml version="1.0" encoding="utf-8"?>
-<p:sld xmlns:a="http://schemas.openxmlformats.org/drawingml/2006/main" xmlns:r="http://schemas.openxmlformats.org/officeDocument/2006/relationships" xmlns:p="http://schemas.openxmlformats.org/presentationml/2006/main">
-  <p:cSld>
-    <p:spTree>
-      <p:nvGrpSpPr>
-        <p:cNvPr id="1" name=""/>
-        <p:cNvGrpSpPr/>
-        <p:nvPr/>
-      </p:nvGrpSpPr>
-      <p:grpSpPr>
-        <a:xfrm>
-          <a:off x="0" y="0"/>
-          <a:ext cx="0" cy="0"/>
-          <a:chOff x="0" y="0"/>
-          <a:chExt cx="0" cy="0"/>
-        </a:xfrm>
-      </p:grpSpPr>
       <p:grpSp>
         <p:nvGrpSpPr>
           <p:cNvPr id="13" name="Group 3">
@@ -17767,7 +17693,13 @@
           <a:p>
             <a:r>
               <a:rPr lang="en-US" sz="4000" dirty="0"/>
-              <a:t> Technical Author for </a:t>
+              <a:t>Apache Committer </a:t>
+            </a:r>
+          </a:p>
+          <a:p>
+            <a:r>
+              <a:rPr lang="en-US" sz="4000" dirty="0"/>
+              <a:t>Technical Author for </a:t>
             </a:r>
             <a:r>
               <a:rPr lang="en-US" sz="4000" dirty="0" err="1"/>
@@ -17778,7 +17710,7 @@
           <a:p>
             <a:r>
               <a:rPr lang="en-US" sz="4000" dirty="0"/>
-              <a:t> Apache Committer</a:t>
+              <a:t> </a:t>
             </a:r>
           </a:p>
         </p:txBody>
@@ -18044,6 +17976,122 @@
     <p:extLst>
       <p:ext uri="{BB962C8B-B14F-4D97-AF65-F5344CB8AC3E}">
         <p14:creationId xmlns:p14="http://schemas.microsoft.com/office/powerpoint/2010/main" val="3603353054"/>
+      </p:ext>
+    </p:extLst>
+  </p:cSld>
+  <p:clrMapOvr>
+    <a:masterClrMapping/>
+  </p:clrMapOvr>
+</p:sld>
+</file>
+
+<file path=ppt/slides/slide3.xml><?xml version="1.0" encoding="utf-8"?>
+<p:sld xmlns:a="http://schemas.openxmlformats.org/drawingml/2006/main" xmlns:r="http://schemas.openxmlformats.org/officeDocument/2006/relationships" xmlns:p="http://schemas.openxmlformats.org/presentationml/2006/main">
+  <p:cSld>
+    <p:spTree>
+      <p:nvGrpSpPr>
+        <p:cNvPr id="1" name=""/>
+        <p:cNvGrpSpPr/>
+        <p:nvPr/>
+      </p:nvGrpSpPr>
+      <p:grpSpPr>
+        <a:xfrm>
+          <a:off x="0" y="0"/>
+          <a:ext cx="0" cy="0"/>
+          <a:chOff x="0" y="0"/>
+          <a:chExt cx="0" cy="0"/>
+        </a:xfrm>
+      </p:grpSpPr>
+      <p:sp>
+        <p:nvSpPr>
+          <p:cNvPr id="2" name="Title 1">
+            <a:extLst>
+              <a:ext uri="{FF2B5EF4-FFF2-40B4-BE49-F238E27FC236}">
+                <a16:creationId xmlns:a16="http://schemas.microsoft.com/office/drawing/2014/main" id="{DB840D9E-9197-F4B3-286E-AD7538074489}"/>
+              </a:ext>
+            </a:extLst>
+          </p:cNvPr>
+          <p:cNvSpPr>
+            <a:spLocks noGrp="1"/>
+          </p:cNvSpPr>
+          <p:nvPr>
+            <p:ph type="title"/>
+          </p:nvPr>
+        </p:nvSpPr>
+        <p:spPr/>
+        <p:txBody>
+          <a:bodyPr>
+            <a:normAutofit/>
+          </a:bodyPr>
+          <a:lstStyle/>
+          <a:p>
+            <a:r>
+              <a:rPr lang="en-US" sz="8000" dirty="0">
+                <a:latin typeface="ACADEMY ENGRAVED LET PLAIN:1.0" panose="02000000000000000000" pitchFamily="2" charset="0"/>
+              </a:rPr>
+              <a:t>Agenda</a:t>
+            </a:r>
+          </a:p>
+        </p:txBody>
+      </p:sp>
+      <p:sp>
+        <p:nvSpPr>
+          <p:cNvPr id="3" name="Content Placeholder 2">
+            <a:extLst>
+              <a:ext uri="{FF2B5EF4-FFF2-40B4-BE49-F238E27FC236}">
+                <a16:creationId xmlns:a16="http://schemas.microsoft.com/office/drawing/2014/main" id="{29A25413-0FC3-549D-EA34-D62AE226BA67}"/>
+              </a:ext>
+            </a:extLst>
+          </p:cNvPr>
+          <p:cNvSpPr>
+            <a:spLocks noGrp="1"/>
+          </p:cNvSpPr>
+          <p:nvPr>
+            <p:ph idx="1"/>
+          </p:nvPr>
+        </p:nvSpPr>
+        <p:spPr/>
+        <p:txBody>
+          <a:bodyPr>
+            <a:normAutofit/>
+          </a:bodyPr>
+          <a:lstStyle/>
+          <a:p>
+            <a:endParaRPr lang="en-US" sz="4000" dirty="0"/>
+          </a:p>
+          <a:p>
+            <a:r>
+              <a:rPr lang="en-US" sz="4000" dirty="0"/>
+              <a:t>Working on the Cloud</a:t>
+            </a:r>
+          </a:p>
+          <a:p>
+            <a:r>
+              <a:rPr lang="en-US" sz="4000" dirty="0"/>
+              <a:t>Apache Brooklyn</a:t>
+            </a:r>
+          </a:p>
+          <a:p>
+            <a:r>
+              <a:rPr lang="en-US" sz="4000" dirty="0"/>
+              <a:t>Demo Time!</a:t>
+            </a:r>
+          </a:p>
+          <a:p>
+            <a:r>
+              <a:rPr lang="en-US" sz="4000" dirty="0"/>
+              <a:t>Conclusions &amp; Questions</a:t>
+            </a:r>
+          </a:p>
+          <a:p>
+            <a:endParaRPr lang="en-US" dirty="0"/>
+          </a:p>
+        </p:txBody>
+      </p:sp>
+    </p:spTree>
+    <p:extLst>
+      <p:ext uri="{BB962C8B-B14F-4D97-AF65-F5344CB8AC3E}">
+        <p14:creationId xmlns:p14="http://schemas.microsoft.com/office/powerpoint/2010/main" val="2879295292"/>
       </p:ext>
     </p:extLst>
   </p:cSld>

</xml_diff>

<commit_message>
15 added clusterized version, because why not?
</commit_message>
<xml_diff>
--- a/java-cro-presentation.pptx
+++ b/java-cro-presentation.pptx
@@ -212,7 +212,7 @@
           <a:p>
             <a:fld id="{4BCF8CCE-8CAC-2547-AFBF-48AF55E8671A}" type="datetimeFigureOut">
               <a:rPr lang="en-US" smtClean="0"/>
-              <a:t>10/7/22</a:t>
+              <a:t>10/9/22</a:t>
             </a:fld>
             <a:endParaRPr lang="en-US"/>
           </a:p>
@@ -3383,7 +3383,7 @@
           <a:p>
             <a:fld id="{D208048B-57AF-4F53-BC84-8E0A1033FBEC}" type="datetimeFigureOut">
               <a:rPr lang="en-US" smtClean="0"/>
-              <a:t>10/7/22</a:t>
+              <a:t>10/9/22</a:t>
             </a:fld>
             <a:endParaRPr lang="en-US"/>
           </a:p>
@@ -3581,7 +3581,7 @@
           <a:p>
             <a:fld id="{D208048B-57AF-4F53-BC84-8E0A1033FBEC}" type="datetimeFigureOut">
               <a:rPr lang="en-US" smtClean="0"/>
-              <a:t>10/7/22</a:t>
+              <a:t>10/9/22</a:t>
             </a:fld>
             <a:endParaRPr lang="en-US"/>
           </a:p>
@@ -5118,7 +5118,7 @@
           <a:p>
             <a:fld id="{D208048B-57AF-4F53-BC84-8E0A1033FBEC}" type="datetimeFigureOut">
               <a:rPr lang="en-US" smtClean="0"/>
-              <a:t>10/7/22</a:t>
+              <a:t>10/9/22</a:t>
             </a:fld>
             <a:endParaRPr lang="en-US"/>
           </a:p>
@@ -5318,7 +5318,7 @@
           <a:p>
             <a:fld id="{D208048B-57AF-4F53-BC84-8E0A1033FBEC}" type="datetimeFigureOut">
               <a:rPr lang="en-US" smtClean="0"/>
-              <a:t>10/7/22</a:t>
+              <a:t>10/9/22</a:t>
             </a:fld>
             <a:endParaRPr lang="en-US"/>
           </a:p>
@@ -5596,7 +5596,7 @@
           <a:p>
             <a:fld id="{D208048B-57AF-4F53-BC84-8E0A1033FBEC}" type="datetimeFigureOut">
               <a:rPr lang="en-US" smtClean="0"/>
-              <a:t>10/7/22</a:t>
+              <a:t>10/9/22</a:t>
             </a:fld>
             <a:endParaRPr lang="en-US"/>
           </a:p>
@@ -6574,7 +6574,7 @@
           <a:p>
             <a:fld id="{D208048B-57AF-4F53-BC84-8E0A1033FBEC}" type="datetimeFigureOut">
               <a:rPr lang="en-US" smtClean="0"/>
-              <a:t>10/7/22</a:t>
+              <a:t>10/9/22</a:t>
             </a:fld>
             <a:endParaRPr lang="en-US"/>
           </a:p>
@@ -7694,7 +7694,7 @@
           <a:p>
             <a:fld id="{D208048B-57AF-4F53-BC84-8E0A1033FBEC}" type="datetimeFigureOut">
               <a:rPr lang="en-US" smtClean="0"/>
-              <a:t>10/7/22</a:t>
+              <a:t>10/9/22</a:t>
             </a:fld>
             <a:endParaRPr lang="en-US"/>
           </a:p>
@@ -7841,7 +7841,7 @@
           <a:p>
             <a:fld id="{D208048B-57AF-4F53-BC84-8E0A1033FBEC}" type="datetimeFigureOut">
               <a:rPr lang="en-US" smtClean="0"/>
-              <a:t>10/7/22</a:t>
+              <a:t>10/9/22</a:t>
             </a:fld>
             <a:endParaRPr lang="en-US"/>
           </a:p>
@@ -7954,7 +7954,7 @@
           <a:p>
             <a:fld id="{D208048B-57AF-4F53-BC84-8E0A1033FBEC}" type="datetimeFigureOut">
               <a:rPr lang="en-US" smtClean="0"/>
-              <a:t>10/7/22</a:t>
+              <a:t>10/9/22</a:t>
             </a:fld>
             <a:endParaRPr lang="en-US"/>
           </a:p>
@@ -9600,7 +9600,7 @@
           <a:p>
             <a:fld id="{D208048B-57AF-4F53-BC84-8E0A1033FBEC}" type="datetimeFigureOut">
               <a:rPr lang="en-US" smtClean="0"/>
-              <a:t>10/7/22</a:t>
+              <a:t>10/9/22</a:t>
             </a:fld>
             <a:endParaRPr lang="en-US"/>
           </a:p>
@@ -11238,7 +11238,7 @@
           <a:p>
             <a:fld id="{D208048B-57AF-4F53-BC84-8E0A1033FBEC}" type="datetimeFigureOut">
               <a:rPr lang="en-US" smtClean="0"/>
-              <a:t>10/7/22</a:t>
+              <a:t>10/9/22</a:t>
             </a:fld>
             <a:endParaRPr lang="en-US"/>
           </a:p>
@@ -12161,7 +12161,7 @@
             <a:fld id="{D208048B-57AF-4F53-BC84-8E0A1033FBEC}" type="datetimeFigureOut">
               <a:rPr lang="en-US" smtClean="0"/>
               <a:pPr/>
-              <a:t>10/7/22</a:t>
+              <a:t>10/9/22</a:t>
             </a:fld>
             <a:endParaRPr lang="en-US" dirty="0"/>
           </a:p>
@@ -17366,6 +17366,61 @@
       </p:grpSpPr>
       <p:sp>
         <p:nvSpPr>
+          <p:cNvPr id="4" name="Freeform 4">
+            <a:extLst>
+              <a:ext uri="{FF2B5EF4-FFF2-40B4-BE49-F238E27FC236}">
+                <a16:creationId xmlns:a16="http://schemas.microsoft.com/office/drawing/2014/main" id="{35926152-96BE-0B1E-3F1E-C9079A0E8434}"/>
+              </a:ext>
+            </a:extLst>
+          </p:cNvPr>
+          <p:cNvSpPr/>
+          <p:nvPr/>
+        </p:nvSpPr>
+        <p:spPr>
+          <a:xfrm>
+            <a:off x="457200" y="2096713"/>
+            <a:ext cx="11182574" cy="3907567"/>
+          </a:xfrm>
+          <a:custGeom>
+            <a:avLst/>
+            <a:gdLst/>
+            <a:ahLst/>
+            <a:cxnLst/>
+            <a:rect l="l" t="t" r="r" b="b"/>
+            <a:pathLst>
+              <a:path w="3238067" h="1034890">
+                <a:moveTo>
+                  <a:pt x="0" y="0"/>
+                </a:moveTo>
+                <a:lnTo>
+                  <a:pt x="3238067" y="0"/>
+                </a:lnTo>
+                <a:lnTo>
+                  <a:pt x="3238067" y="1034890"/>
+                </a:lnTo>
+                <a:lnTo>
+                  <a:pt x="0" y="1034890"/>
+                </a:lnTo>
+                <a:close/>
+              </a:path>
+            </a:pathLst>
+          </a:custGeom>
+          <a:solidFill>
+            <a:srgbClr val="102752">
+              <a:alpha val="76081"/>
+            </a:srgbClr>
+          </a:solidFill>
+        </p:spPr>
+        <p:txBody>
+          <a:bodyPr/>
+          <a:lstStyle/>
+          <a:p>
+            <a:endParaRPr lang="en-US" dirty="0"/>
+          </a:p>
+        </p:txBody>
+      </p:sp>
+      <p:sp>
+        <p:nvSpPr>
           <p:cNvPr id="2" name="Title 1">
             <a:extLst>
               <a:ext uri="{FF2B5EF4-FFF2-40B4-BE49-F238E27FC236}">
@@ -17380,7 +17435,12 @@
             <p:ph type="title"/>
           </p:nvPr>
         </p:nvSpPr>
-        <p:spPr/>
+        <p:spPr>
+          <a:xfrm>
+            <a:off x="457200" y="345320"/>
+            <a:ext cx="7685037" cy="1325563"/>
+          </a:xfrm>
+        </p:spPr>
         <p:txBody>
           <a:bodyPr/>
           <a:lstStyle/>
@@ -17414,7 +17474,7 @@
         <p:spPr>
           <a:xfrm>
             <a:off x="457200" y="2096713"/>
-            <a:ext cx="8756073" cy="4080250"/>
+            <a:ext cx="9805595" cy="4080250"/>
           </a:xfrm>
         </p:spPr>
         <p:txBody>
@@ -17444,6 +17504,36 @@
             <a:r>
               <a:rPr lang="en-US" sz="3600" dirty="0"/>
               <a:t>https://kubernetes.io</a:t>
+            </a:r>
+          </a:p>
+          <a:p>
+            <a:r>
+              <a:rPr lang="en-US" sz="3600" dirty="0"/>
+              <a:t>https://</a:t>
+            </a:r>
+            <a:r>
+              <a:rPr lang="en-US" sz="3600" dirty="0" err="1"/>
+              <a:t>github.com</a:t>
+            </a:r>
+            <a:r>
+              <a:rPr lang="en-US" sz="3600" dirty="0"/>
+              <a:t>/</a:t>
+            </a:r>
+            <a:r>
+              <a:rPr lang="en-US" sz="3600" dirty="0" err="1"/>
+              <a:t>cloudsoft</a:t>
+            </a:r>
+            <a:r>
+              <a:rPr lang="en-US" sz="3600" dirty="0"/>
+              <a:t>/</a:t>
+            </a:r>
+            <a:r>
+              <a:rPr lang="en-US" sz="3600" dirty="0" err="1"/>
+              <a:t>brooklyn</a:t>
+            </a:r>
+            <a:r>
+              <a:rPr lang="en-US" sz="3600" dirty="0"/>
+              <a:t>-terraform</a:t>
             </a:r>
           </a:p>
           <a:p>

</xml_diff>

<commit_message>
17 changed befre Java Cro 2022
</commit_message>
<xml_diff>
--- a/java-cro-presentation.pptx
+++ b/java-cro-presentation.pptx
@@ -5,7 +5,7 @@
     <p:sldMasterId id="2147483669" r:id="rId1"/>
   </p:sldMasterIdLst>
   <p:notesMasterIdLst>
-    <p:notesMasterId r:id="rId18"/>
+    <p:notesMasterId r:id="rId19"/>
   </p:notesMasterIdLst>
   <p:sldIdLst>
     <p:sldId id="256" r:id="rId2"/>
@@ -17,13 +17,14 @@
     <p:sldId id="270" r:id="rId8"/>
     <p:sldId id="264" r:id="rId9"/>
     <p:sldId id="271" r:id="rId10"/>
-    <p:sldId id="266" r:id="rId11"/>
-    <p:sldId id="273" r:id="rId12"/>
-    <p:sldId id="262" r:id="rId13"/>
-    <p:sldId id="275" r:id="rId14"/>
-    <p:sldId id="268" r:id="rId15"/>
-    <p:sldId id="274" r:id="rId16"/>
-    <p:sldId id="265" r:id="rId17"/>
+    <p:sldId id="276" r:id="rId11"/>
+    <p:sldId id="266" r:id="rId12"/>
+    <p:sldId id="273" r:id="rId13"/>
+    <p:sldId id="262" r:id="rId14"/>
+    <p:sldId id="275" r:id="rId15"/>
+    <p:sldId id="268" r:id="rId16"/>
+    <p:sldId id="274" r:id="rId17"/>
+    <p:sldId id="265" r:id="rId18"/>
   </p:sldIdLst>
   <p:sldSz cx="12192000" cy="6858000"/>
   <p:notesSz cx="6858000" cy="9144000"/>
@@ -212,7 +213,7 @@
           <a:p>
             <a:fld id="{4BCF8CCE-8CAC-2547-AFBF-48AF55E8671A}" type="datetimeFigureOut">
               <a:rPr lang="en-US" smtClean="0"/>
-              <a:t>10/9/22</a:t>
+              <a:t>10/11/22</a:t>
             </a:fld>
             <a:endParaRPr lang="en-US"/>
           </a:p>
@@ -617,18 +618,7 @@
           <a:bodyPr/>
           <a:lstStyle/>
           <a:p>
-            <a:r>
-              <a:rPr lang="en-US" dirty="0"/>
-              <a:t>Yes, I added a native Spring Boot App, running on </a:t>
-            </a:r>
-            <a:r>
-              <a:rPr lang="en-US" dirty="0" err="1"/>
-              <a:t>GraalVM</a:t>
-            </a:r>
-            <a:r>
-              <a:rPr lang="en-US" dirty="0"/>
-              <a:t> because this is the hype right now, and I have to write about it in my latest book.  </a:t>
-            </a:r>
+            <a:endParaRPr lang="en-US" dirty="0"/>
           </a:p>
         </p:txBody>
       </p:sp>
@@ -658,7 +648,7 @@
     </p:spTree>
     <p:extLst>
       <p:ext uri="{BB962C8B-B14F-4D97-AF65-F5344CB8AC3E}">
-        <p14:creationId xmlns:p14="http://schemas.microsoft.com/office/powerpoint/2010/main" val="1957204630"/>
+        <p14:creationId xmlns:p14="http://schemas.microsoft.com/office/powerpoint/2010/main" val="1379151011"/>
       </p:ext>
     </p:extLst>
   </p:cSld>
@@ -725,36 +715,6 @@
               <a:t> because this is the hype right now, and I have to write about it in my latest book.  </a:t>
             </a:r>
           </a:p>
-          <a:p>
-            <a:r>
-              <a:rPr lang="en-US" dirty="0"/>
-              <a:t>Well.. Not all worked as expected, as you will see – because I need different images for EKS, since I have a mac with Silicone M1 chip. </a:t>
-            </a:r>
-          </a:p>
-          <a:p>
-            <a:r>
-              <a:rPr lang="en-US" dirty="0"/>
-              <a:t>After demo, use text comparator to compare the types -&gt; show that there are barely any differences</a:t>
-            </a:r>
-          </a:p>
-          <a:p>
-            <a:endParaRPr lang="en-US" dirty="0"/>
-          </a:p>
-          <a:p>
-            <a:r>
-              <a:rPr lang="en-US" dirty="0"/>
-              <a:t>On EKS we also need ECR to load our Docker images</a:t>
-            </a:r>
-          </a:p>
-          <a:p>
-            <a:endParaRPr lang="en-US" dirty="0"/>
-          </a:p>
-          <a:p>
-            <a:r>
-              <a:rPr lang="en-US" dirty="0"/>
-              <a:t>And because we are Scottish, we don’t have a progress bar, or a pie chart, we have a kilt diagram</a:t>
-            </a:r>
-          </a:p>
         </p:txBody>
       </p:sp>
       <p:sp>
@@ -783,7 +743,7 @@
     </p:spTree>
     <p:extLst>
       <p:ext uri="{BB962C8B-B14F-4D97-AF65-F5344CB8AC3E}">
-        <p14:creationId xmlns:p14="http://schemas.microsoft.com/office/powerpoint/2010/main" val="3853619628"/>
+        <p14:creationId xmlns:p14="http://schemas.microsoft.com/office/powerpoint/2010/main" val="1957204630"/>
       </p:ext>
     </p:extLst>
   </p:cSld>
@@ -837,26 +797,29 @@
           <a:bodyPr/>
           <a:lstStyle/>
           <a:p>
-            <a:pPr marL="0" marR="0" lvl="0" indent="0" algn="l" defTabSz="914400" rtl="0" eaLnBrk="1" fontAlgn="auto" latinLnBrk="0" hangingPunct="1">
-              <a:lnSpc>
-                <a:spcPct val="100000"/>
-              </a:lnSpc>
-              <a:spcBef>
-                <a:spcPts val="0"/>
-              </a:spcBef>
-              <a:spcAft>
-                <a:spcPts val="0"/>
-              </a:spcAft>
-              <a:buClrTx/>
-              <a:buSzTx/>
-              <a:buFontTx/>
-              <a:buNone/>
-              <a:tabLst/>
-              <a:defRPr/>
-            </a:pPr>
             <a:r>
               <a:rPr lang="en-US" dirty="0"/>
-              <a:t>Working in the cloud is like driving a car – you do not need to know what individual parts are made of, most time you do  not even have to know how they work together, but you do have to customize a few details, right? You have to adjust mirrors, the chair, the air conditioning and the music. </a:t>
+              <a:t>Yes, I added a native Spring Boot App, running on </a:t>
+            </a:r>
+            <a:r>
+              <a:rPr lang="en-US" dirty="0" err="1"/>
+              <a:t>GraalVM</a:t>
+            </a:r>
+            <a:r>
+              <a:rPr lang="en-US" dirty="0"/>
+              <a:t> because this is the hype right now, and I have to write about it in my latest book.  </a:t>
+            </a:r>
+          </a:p>
+          <a:p>
+            <a:r>
+              <a:rPr lang="en-US" dirty="0"/>
+              <a:t>Well.. Not all worked as expected, as you will see – because I need different images for EKS, since I have a mac with Silicone M1 chip. </a:t>
+            </a:r>
+          </a:p>
+          <a:p>
+            <a:r>
+              <a:rPr lang="en-US" dirty="0"/>
+              <a:t>After demo, use text comparator to compare the types -&gt; show that there are barely any differences</a:t>
             </a:r>
           </a:p>
           <a:p>
@@ -865,38 +828,17 @@
           <a:p>
             <a:r>
               <a:rPr lang="en-US" dirty="0"/>
-              <a:t>It depends </a:t>
-            </a:r>
-          </a:p>
-          <a:p>
-            <a:pPr marL="171450" indent="-171450">
-              <a:buFontTx/>
-              <a:buChar char="-"/>
-            </a:pPr>
+              <a:t>On EKS we also need ECR to load our Docker images</a:t>
+            </a:r>
+          </a:p>
+          <a:p>
+            <a:endParaRPr lang="en-US" dirty="0"/>
+          </a:p>
+          <a:p>
             <a:r>
               <a:rPr lang="en-US" dirty="0"/>
-              <a:t>Obviously if you are developing on a computer with a different architecture, you need to build different Docker images. </a:t>
-            </a:r>
-          </a:p>
-          <a:p>
-            <a:pPr marL="171450" indent="-171450">
-              <a:buFontTx/>
-              <a:buChar char="-"/>
-            </a:pPr>
-            <a:r>
-              <a:rPr lang="en-US" dirty="0"/>
-              <a:t>On your local you are not worries with details such as domains and public access, when deploying to the cloud you have to take care of these, and might require additional configuration.</a:t>
-            </a:r>
-          </a:p>
-          <a:p>
-            <a:pPr marL="171450" indent="-171450">
-              <a:buFontTx/>
-              <a:buChar char="-"/>
-            </a:pPr>
-            <a:endParaRPr lang="en-US" dirty="0"/>
-          </a:p>
-          <a:p>
-            <a:endParaRPr lang="en-US" dirty="0"/>
+              <a:t>And because we are Scottish, we don’t have a progress bar, or a pie chart, we have a kilt diagram</a:t>
+            </a:r>
           </a:p>
         </p:txBody>
       </p:sp>
@@ -926,7 +868,7 @@
     </p:spTree>
     <p:extLst>
       <p:ext uri="{BB962C8B-B14F-4D97-AF65-F5344CB8AC3E}">
-        <p14:creationId xmlns:p14="http://schemas.microsoft.com/office/powerpoint/2010/main" val="3534899792"/>
+        <p14:creationId xmlns:p14="http://schemas.microsoft.com/office/powerpoint/2010/main" val="3853619628"/>
       </p:ext>
     </p:extLst>
   </p:cSld>
@@ -1005,6 +947,42 @@
           <a:p>
             <a:endParaRPr lang="en-US" dirty="0"/>
           </a:p>
+          <a:p>
+            <a:r>
+              <a:rPr lang="en-US" dirty="0"/>
+              <a:t>It depends </a:t>
+            </a:r>
+          </a:p>
+          <a:p>
+            <a:pPr marL="171450" indent="-171450">
+              <a:buFontTx/>
+              <a:buChar char="-"/>
+            </a:pPr>
+            <a:r>
+              <a:rPr lang="en-US" dirty="0"/>
+              <a:t>Obviously if you are developing on a computer with a different architecture, you need to build different Docker images. </a:t>
+            </a:r>
+          </a:p>
+          <a:p>
+            <a:pPr marL="171450" indent="-171450">
+              <a:buFontTx/>
+              <a:buChar char="-"/>
+            </a:pPr>
+            <a:r>
+              <a:rPr lang="en-US" dirty="0"/>
+              <a:t>On your local you are not worries with details such as domains and public access, when deploying to the cloud you have to take care of these, and might require additional configuration.</a:t>
+            </a:r>
+          </a:p>
+          <a:p>
+            <a:pPr marL="171450" indent="-171450">
+              <a:buFontTx/>
+              <a:buChar char="-"/>
+            </a:pPr>
+            <a:endParaRPr lang="en-US" dirty="0"/>
+          </a:p>
+          <a:p>
+            <a:endParaRPr lang="en-US" dirty="0"/>
+          </a:p>
         </p:txBody>
       </p:sp>
       <p:sp>
@@ -1033,7 +1011,7 @@
     </p:spTree>
     <p:extLst>
       <p:ext uri="{BB962C8B-B14F-4D97-AF65-F5344CB8AC3E}">
-        <p14:creationId xmlns:p14="http://schemas.microsoft.com/office/powerpoint/2010/main" val="2718659789"/>
+        <p14:creationId xmlns:p14="http://schemas.microsoft.com/office/powerpoint/2010/main" val="3534899792"/>
       </p:ext>
     </p:extLst>
   </p:cSld>
@@ -1087,6 +1065,29 @@
           <a:bodyPr/>
           <a:lstStyle/>
           <a:p>
+            <a:pPr marL="0" marR="0" lvl="0" indent="0" algn="l" defTabSz="914400" rtl="0" eaLnBrk="1" fontAlgn="auto" latinLnBrk="0" hangingPunct="1">
+              <a:lnSpc>
+                <a:spcPct val="100000"/>
+              </a:lnSpc>
+              <a:spcBef>
+                <a:spcPts val="0"/>
+              </a:spcBef>
+              <a:spcAft>
+                <a:spcPts val="0"/>
+              </a:spcAft>
+              <a:buClrTx/>
+              <a:buSzTx/>
+              <a:buFontTx/>
+              <a:buNone/>
+              <a:tabLst/>
+              <a:defRPr/>
+            </a:pPr>
+            <a:r>
+              <a:rPr lang="en-US" dirty="0"/>
+              <a:t>Working in the cloud is like driving a car – you do not need to know what individual parts are made of, most time you do  not even have to know how they work together, but you do have to customize a few details, right? You have to adjust mirrors, the chair, the air conditioning and the music. </a:t>
+            </a:r>
+          </a:p>
+          <a:p>
             <a:endParaRPr lang="en-US" dirty="0"/>
           </a:p>
         </p:txBody>
@@ -1109,6 +1110,90 @@
             <a:fld id="{D62F27D6-02B0-9E4F-9688-CC4BB499F553}" type="slidenum">
               <a:rPr lang="en-US" smtClean="0"/>
               <a:t>16</a:t>
+            </a:fld>
+            <a:endParaRPr lang="en-US"/>
+          </a:p>
+        </p:txBody>
+      </p:sp>
+    </p:spTree>
+    <p:extLst>
+      <p:ext uri="{BB962C8B-B14F-4D97-AF65-F5344CB8AC3E}">
+        <p14:creationId xmlns:p14="http://schemas.microsoft.com/office/powerpoint/2010/main" val="2718659789"/>
+      </p:ext>
+    </p:extLst>
+  </p:cSld>
+  <p:clrMapOvr>
+    <a:masterClrMapping/>
+  </p:clrMapOvr>
+</p:notes>
+</file>
+
+<file path=ppt/notesSlides/notesSlide15.xml><?xml version="1.0" encoding="utf-8"?>
+<p:notes xmlns:a="http://schemas.openxmlformats.org/drawingml/2006/main" xmlns:r="http://schemas.openxmlformats.org/officeDocument/2006/relationships" xmlns:p="http://schemas.openxmlformats.org/presentationml/2006/main">
+  <p:cSld>
+    <p:spTree>
+      <p:nvGrpSpPr>
+        <p:cNvPr id="1" name=""/>
+        <p:cNvGrpSpPr/>
+        <p:nvPr/>
+      </p:nvGrpSpPr>
+      <p:grpSpPr>
+        <a:xfrm>
+          <a:off x="0" y="0"/>
+          <a:ext cx="0" cy="0"/>
+          <a:chOff x="0" y="0"/>
+          <a:chExt cx="0" cy="0"/>
+        </a:xfrm>
+      </p:grpSpPr>
+      <p:sp>
+        <p:nvSpPr>
+          <p:cNvPr id="2" name="Slide Image Placeholder 1"/>
+          <p:cNvSpPr>
+            <a:spLocks noGrp="1" noRot="1" noChangeAspect="1"/>
+          </p:cNvSpPr>
+          <p:nvPr>
+            <p:ph type="sldImg"/>
+          </p:nvPr>
+        </p:nvSpPr>
+        <p:spPr/>
+      </p:sp>
+      <p:sp>
+        <p:nvSpPr>
+          <p:cNvPr id="3" name="Notes Placeholder 2"/>
+          <p:cNvSpPr>
+            <a:spLocks noGrp="1"/>
+          </p:cNvSpPr>
+          <p:nvPr>
+            <p:ph type="body" idx="1"/>
+          </p:nvPr>
+        </p:nvSpPr>
+        <p:spPr/>
+        <p:txBody>
+          <a:bodyPr/>
+          <a:lstStyle/>
+          <a:p>
+            <a:endParaRPr lang="en-US" dirty="0"/>
+          </a:p>
+        </p:txBody>
+      </p:sp>
+      <p:sp>
+        <p:nvSpPr>
+          <p:cNvPr id="4" name="Slide Number Placeholder 3"/>
+          <p:cNvSpPr>
+            <a:spLocks noGrp="1"/>
+          </p:cNvSpPr>
+          <p:nvPr>
+            <p:ph type="sldNum" sz="quarter" idx="5"/>
+          </p:nvPr>
+        </p:nvSpPr>
+        <p:spPr/>
+        <p:txBody>
+          <a:bodyPr/>
+          <a:lstStyle/>
+          <a:p>
+            <a:fld id="{D62F27D6-02B0-9E4F-9688-CC4BB499F553}" type="slidenum">
+              <a:rPr lang="en-US" smtClean="0"/>
+              <a:t>17</a:t>
             </a:fld>
             <a:endParaRPr lang="en-US"/>
           </a:p>
@@ -1702,13 +1787,8 @@
             </a:pPr>
             <a:r>
               <a:rPr lang="en-US" dirty="0"/>
-              <a:t>Amazon – this looks </a:t>
-            </a:r>
-            <a:r>
-              <a:rPr lang="en-US" dirty="0" err="1"/>
-              <a:t>familliar</a:t>
-            </a:r>
-            <a:endParaRPr lang="en-US" dirty="0"/>
+              <a:t>Amazon – this looks familiar</a:t>
+            </a:r>
           </a:p>
           <a:p>
             <a:pPr marL="171450" indent="-171450">
@@ -1831,7 +1911,7 @@
             </a:pPr>
             <a:r>
               <a:rPr lang="en-US" dirty="0"/>
-              <a:t>- You are stuck to it. Moving from a cloud provider to another is very… close to impossible.</a:t>
+              <a:t>- You are stuck to it. Moving from a cloud provider to another is very… close to impossible. Moving from one mac to another analogy.</a:t>
             </a:r>
           </a:p>
         </p:txBody>
@@ -3040,74 +3120,46 @@
           <a:bodyPr/>
           <a:lstStyle/>
           <a:p>
-            <a:r>
-              <a:rPr lang="en-US" dirty="0"/>
-              <a:t>SSH mode: Basically Apache Brooklyn </a:t>
-            </a:r>
-            <a:r>
-              <a:rPr lang="en-US" dirty="0" err="1"/>
-              <a:t>ssh</a:t>
-            </a:r>
-            <a:r>
-              <a:rPr lang="en-US" dirty="0"/>
-              <a:t>-es into VM and installs there what you tell it to install.</a:t>
-            </a:r>
-          </a:p>
-          <a:p>
-            <a:endParaRPr lang="en-US" dirty="0"/>
-          </a:p>
-          <a:p>
-            <a:r>
-              <a:rPr lang="en-US" dirty="0"/>
-              <a:t>For AWS cloud the module the library that support remote manipulation of resources is named </a:t>
-            </a:r>
-            <a:r>
-              <a:rPr lang="en-US" dirty="0" err="1"/>
-              <a:t>JClouds</a:t>
-            </a:r>
-            <a:r>
-              <a:rPr lang="en-US" dirty="0"/>
-              <a:t>. </a:t>
-            </a:r>
-          </a:p>
-          <a:p>
-            <a:endParaRPr lang="en-US" dirty="0"/>
-          </a:p>
-          <a:p>
-            <a:r>
-              <a:rPr lang="en-US" dirty="0"/>
-              <a:t>The terraform module – provides a few types for the catalog that allow Apache Brooklyn to interact with terraform on your behalf. You don’t have to touch the CLI anymore, and Apache Brooklyn renders the  resources state via various sensors… and you can add your own.  I don’t want to brag but I worked on it, and had a blast writing the code. </a:t>
-            </a:r>
-          </a:p>
-          <a:p>
-            <a:r>
-              <a:rPr lang="en-US" dirty="0"/>
-              <a:t>The advantage of this module is that you can actually import an existing terraform deployment into Apache Brooklyn. </a:t>
-            </a:r>
-          </a:p>
-          <a:p>
-            <a:endParaRPr lang="en-US" dirty="0"/>
-          </a:p>
-          <a:p>
-            <a:r>
-              <a:rPr lang="en-US" dirty="0"/>
-              <a:t>We have a Kubernetes module - provides a few types for the catalog that allow Apache Brooklyn to interact with </a:t>
-            </a:r>
-            <a:r>
-              <a:rPr lang="en-US" dirty="0" err="1"/>
-              <a:t>kubectl</a:t>
-            </a:r>
-            <a:r>
-              <a:rPr lang="en-US" dirty="0"/>
-              <a:t>  on your behalf and deploy and monitor applications </a:t>
-            </a:r>
-            <a:r>
-              <a:rPr lang="en-US" dirty="0" err="1"/>
-              <a:t>ona</a:t>
-            </a:r>
-            <a:r>
-              <a:rPr lang="en-US" dirty="0"/>
-              <a:t> Kubernetes cluster</a:t>
+            <a:pPr marL="171450" indent="-171450">
+              <a:buFontTx/>
+              <a:buChar char="-"/>
+            </a:pPr>
+            <a:endParaRPr lang="en-GB" b="0" i="0" dirty="0">
+              <a:solidFill>
+                <a:srgbClr val="BDC1C6"/>
+              </a:solidFill>
+              <a:effectLst/>
+              <a:latin typeface="arial" panose="020B0604020202020204" pitchFamily="34" charset="0"/>
+            </a:endParaRPr>
+          </a:p>
+          <a:p>
+            <a:pPr marL="171450" indent="-171450">
+              <a:buFontTx/>
+              <a:buChar char="-"/>
+            </a:pPr>
+            <a:r>
+              <a:rPr lang="en-GB" dirty="0"/>
+              <a:t>Apache Brooklyn is built for agile deployment of applications across cloud and other targets, and real-time </a:t>
+            </a:r>
+            <a:r>
+              <a:rPr lang="en-GB" dirty="0">
+                <a:hlinkClick r:id="rId3" tooltip="Refers to the self-managing characteristics of distributed computing resources,&#10;adapting to unpredictable changes while hiding intrinsic complexity to&#10;operators and users."/>
+              </a:rPr>
+              <a:t>autonomic</a:t>
+            </a:r>
+            <a:r>
+              <a:rPr lang="en-GB" dirty="0"/>
+              <a:t> management. "</a:t>
+            </a:r>
+            <a:r>
+              <a:rPr lang="en-GB" dirty="0">
+                <a:hlinkClick r:id="rId3" tooltip="Refers to the self-managing characteristics of distributed computing resources,&#10;adapting to unpredictable changes while hiding intrinsic complexity to&#10;operators and users."/>
+              </a:rPr>
+              <a:t>Autonomic</a:t>
+            </a:r>
+            <a:r>
+              <a:rPr lang="en-GB" dirty="0"/>
+              <a:t> computing" is the concept of components looking after themselves where possible (self-healing, self-optimizing, etc)</a:t>
             </a:r>
           </a:p>
         </p:txBody>
@@ -3138,7 +3190,7 @@
     </p:spTree>
     <p:extLst>
       <p:ext uri="{BB962C8B-B14F-4D97-AF65-F5344CB8AC3E}">
-        <p14:creationId xmlns:p14="http://schemas.microsoft.com/office/powerpoint/2010/main" val="3148425993"/>
+        <p14:creationId xmlns:p14="http://schemas.microsoft.com/office/powerpoint/2010/main" val="2607748947"/>
       </p:ext>
     </p:extLst>
   </p:cSld>
@@ -3192,7 +3244,75 @@
           <a:bodyPr/>
           <a:lstStyle/>
           <a:p>
+            <a:r>
+              <a:rPr lang="en-US" dirty="0"/>
+              <a:t>SSH mode: Basically Apache Brooklyn </a:t>
+            </a:r>
+            <a:r>
+              <a:rPr lang="en-US" dirty="0" err="1"/>
+              <a:t>ssh</a:t>
+            </a:r>
+            <a:r>
+              <a:rPr lang="en-US" dirty="0"/>
+              <a:t>-es into VM and installs there what you tell it to install.</a:t>
+            </a:r>
+          </a:p>
+          <a:p>
             <a:endParaRPr lang="en-US" dirty="0"/>
+          </a:p>
+          <a:p>
+            <a:r>
+              <a:rPr lang="en-US" dirty="0"/>
+              <a:t>For AWS cloud the module the library that support remote manipulation of resources is named </a:t>
+            </a:r>
+            <a:r>
+              <a:rPr lang="en-US" dirty="0" err="1"/>
+              <a:t>JClouds</a:t>
+            </a:r>
+            <a:r>
+              <a:rPr lang="en-US" dirty="0"/>
+              <a:t>. </a:t>
+            </a:r>
+          </a:p>
+          <a:p>
+            <a:endParaRPr lang="en-US" dirty="0"/>
+          </a:p>
+          <a:p>
+            <a:r>
+              <a:rPr lang="en-US" dirty="0"/>
+              <a:t>The terraform module – provides a few types for the catalog that allow Apache Brooklyn to interact with terraform on your behalf. You don’t have to touch the CLI anymore, and Apache Brooklyn renders the  resources state via various sensors… and you can add your own.  I don’t want to brag but I worked on it, and had a blast writing the code. </a:t>
+            </a:r>
+          </a:p>
+          <a:p>
+            <a:r>
+              <a:rPr lang="en-US" dirty="0"/>
+              <a:t>The advantage of this module is that you can actually import an existing terraform deployment into Apache Brooklyn. </a:t>
+            </a:r>
+          </a:p>
+          <a:p>
+            <a:endParaRPr lang="en-US" dirty="0"/>
+          </a:p>
+          <a:p>
+            <a:r>
+              <a:rPr lang="en-US" dirty="0"/>
+              <a:t>We have a Kubernetes module - provides a few types for the catalog that allow Apache Brooklyn to interact with </a:t>
+            </a:r>
+            <a:r>
+              <a:rPr lang="en-US" dirty="0" err="1"/>
+              <a:t>kubectl</a:t>
+            </a:r>
+            <a:r>
+              <a:rPr lang="en-US" dirty="0"/>
+              <a:t>  on your behalf and deploy and monitor applications </a:t>
+            </a:r>
+            <a:r>
+              <a:rPr lang="en-US" dirty="0" err="1"/>
+              <a:t>ona</a:t>
+            </a:r>
+            <a:r>
+              <a:rPr lang="en-US" dirty="0"/>
+              <a:t> Kubernetes cluster</a:t>
+            </a:r>
           </a:p>
         </p:txBody>
       </p:sp>
@@ -3222,7 +3342,7 @@
     </p:spTree>
     <p:extLst>
       <p:ext uri="{BB962C8B-B14F-4D97-AF65-F5344CB8AC3E}">
-        <p14:creationId xmlns:p14="http://schemas.microsoft.com/office/powerpoint/2010/main" val="1379151011"/>
+        <p14:creationId xmlns:p14="http://schemas.microsoft.com/office/powerpoint/2010/main" val="3148425993"/>
       </p:ext>
     </p:extLst>
   </p:cSld>
@@ -3383,7 +3503,7 @@
           <a:p>
             <a:fld id="{D208048B-57AF-4F53-BC84-8E0A1033FBEC}" type="datetimeFigureOut">
               <a:rPr lang="en-US" smtClean="0"/>
-              <a:t>10/9/22</a:t>
+              <a:t>10/11/22</a:t>
             </a:fld>
             <a:endParaRPr lang="en-US"/>
           </a:p>
@@ -3581,7 +3701,7 @@
           <a:p>
             <a:fld id="{D208048B-57AF-4F53-BC84-8E0A1033FBEC}" type="datetimeFigureOut">
               <a:rPr lang="en-US" smtClean="0"/>
-              <a:t>10/9/22</a:t>
+              <a:t>10/11/22</a:t>
             </a:fld>
             <a:endParaRPr lang="en-US"/>
           </a:p>
@@ -5118,7 +5238,7 @@
           <a:p>
             <a:fld id="{D208048B-57AF-4F53-BC84-8E0A1033FBEC}" type="datetimeFigureOut">
               <a:rPr lang="en-US" smtClean="0"/>
-              <a:t>10/9/22</a:t>
+              <a:t>10/11/22</a:t>
             </a:fld>
             <a:endParaRPr lang="en-US"/>
           </a:p>
@@ -5318,7 +5438,7 @@
           <a:p>
             <a:fld id="{D208048B-57AF-4F53-BC84-8E0A1033FBEC}" type="datetimeFigureOut">
               <a:rPr lang="en-US" smtClean="0"/>
-              <a:t>10/9/22</a:t>
+              <a:t>10/11/22</a:t>
             </a:fld>
             <a:endParaRPr lang="en-US"/>
           </a:p>
@@ -5596,7 +5716,7 @@
           <a:p>
             <a:fld id="{D208048B-57AF-4F53-BC84-8E0A1033FBEC}" type="datetimeFigureOut">
               <a:rPr lang="en-US" smtClean="0"/>
-              <a:t>10/9/22</a:t>
+              <a:t>10/11/22</a:t>
             </a:fld>
             <a:endParaRPr lang="en-US"/>
           </a:p>
@@ -6574,7 +6694,7 @@
           <a:p>
             <a:fld id="{D208048B-57AF-4F53-BC84-8E0A1033FBEC}" type="datetimeFigureOut">
               <a:rPr lang="en-US" smtClean="0"/>
-              <a:t>10/9/22</a:t>
+              <a:t>10/11/22</a:t>
             </a:fld>
             <a:endParaRPr lang="en-US"/>
           </a:p>
@@ -7694,7 +7814,7 @@
           <a:p>
             <a:fld id="{D208048B-57AF-4F53-BC84-8E0A1033FBEC}" type="datetimeFigureOut">
               <a:rPr lang="en-US" smtClean="0"/>
-              <a:t>10/9/22</a:t>
+              <a:t>10/11/22</a:t>
             </a:fld>
             <a:endParaRPr lang="en-US"/>
           </a:p>
@@ -7841,7 +7961,7 @@
           <a:p>
             <a:fld id="{D208048B-57AF-4F53-BC84-8E0A1033FBEC}" type="datetimeFigureOut">
               <a:rPr lang="en-US" smtClean="0"/>
-              <a:t>10/9/22</a:t>
+              <a:t>10/11/22</a:t>
             </a:fld>
             <a:endParaRPr lang="en-US"/>
           </a:p>
@@ -7954,7 +8074,7 @@
           <a:p>
             <a:fld id="{D208048B-57AF-4F53-BC84-8E0A1033FBEC}" type="datetimeFigureOut">
               <a:rPr lang="en-US" smtClean="0"/>
-              <a:t>10/9/22</a:t>
+              <a:t>10/11/22</a:t>
             </a:fld>
             <a:endParaRPr lang="en-US"/>
           </a:p>
@@ -9600,7 +9720,7 @@
           <a:p>
             <a:fld id="{D208048B-57AF-4F53-BC84-8E0A1033FBEC}" type="datetimeFigureOut">
               <a:rPr lang="en-US" smtClean="0"/>
-              <a:t>10/9/22</a:t>
+              <a:t>10/11/22</a:t>
             </a:fld>
             <a:endParaRPr lang="en-US"/>
           </a:p>
@@ -11238,7 +11358,7 @@
           <a:p>
             <a:fld id="{D208048B-57AF-4F53-BC84-8E0A1033FBEC}" type="datetimeFigureOut">
               <a:rPr lang="en-US" smtClean="0"/>
-              <a:t>10/9/22</a:t>
+              <a:t>10/11/22</a:t>
             </a:fld>
             <a:endParaRPr lang="en-US"/>
           </a:p>
@@ -12161,7 +12281,7 @@
             <a:fld id="{D208048B-57AF-4F53-BC84-8E0A1033FBEC}" type="datetimeFigureOut">
               <a:rPr lang="en-US" smtClean="0"/>
               <a:pPr/>
-              <a:t>10/9/22</a:t>
+              <a:t>10/11/22</a:t>
             </a:fld>
             <a:endParaRPr lang="en-US" dirty="0"/>
           </a:p>
@@ -13597,6 +13717,220 @@
       </p:grpSpPr>
       <p:sp>
         <p:nvSpPr>
+          <p:cNvPr id="2" name="Title 1">
+            <a:extLst>
+              <a:ext uri="{FF2B5EF4-FFF2-40B4-BE49-F238E27FC236}">
+                <a16:creationId xmlns:a16="http://schemas.microsoft.com/office/drawing/2014/main" id="{1C0AB0B1-9EA2-3ECA-F5D1-7B7F99C5EA68}"/>
+              </a:ext>
+            </a:extLst>
+          </p:cNvPr>
+          <p:cNvSpPr>
+            <a:spLocks noGrp="1"/>
+          </p:cNvSpPr>
+          <p:nvPr>
+            <p:ph type="title"/>
+          </p:nvPr>
+        </p:nvSpPr>
+        <p:spPr>
+          <a:xfrm>
+            <a:off x="457200" y="-107806"/>
+            <a:ext cx="7685037" cy="1325563"/>
+          </a:xfrm>
+        </p:spPr>
+        <p:txBody>
+          <a:bodyPr/>
+          <a:lstStyle/>
+          <a:p>
+            <a:r>
+              <a:rPr lang="en-US" dirty="0">
+                <a:latin typeface="ACADEMY ENGRAVED LET PLAIN:1.0" panose="02000000000000000000" pitchFamily="2" charset="0"/>
+              </a:rPr>
+              <a:t>Autonomic Management</a:t>
+            </a:r>
+            <a:endParaRPr lang="en-US" dirty="0"/>
+          </a:p>
+        </p:txBody>
+      </p:sp>
+      <p:sp>
+        <p:nvSpPr>
+          <p:cNvPr id="3" name="Content Placeholder 2">
+            <a:extLst>
+              <a:ext uri="{FF2B5EF4-FFF2-40B4-BE49-F238E27FC236}">
+                <a16:creationId xmlns:a16="http://schemas.microsoft.com/office/drawing/2014/main" id="{0E90ECD8-9167-539F-72E5-7E7A5A182E29}"/>
+              </a:ext>
+            </a:extLst>
+          </p:cNvPr>
+          <p:cNvSpPr>
+            <a:spLocks noGrp="1"/>
+          </p:cNvSpPr>
+          <p:nvPr>
+            <p:ph idx="1"/>
+          </p:nvPr>
+        </p:nvSpPr>
+        <p:spPr>
+          <a:xfrm>
+            <a:off x="457200" y="1579418"/>
+            <a:ext cx="7992533" cy="4597545"/>
+          </a:xfrm>
+        </p:spPr>
+        <p:txBody>
+          <a:bodyPr>
+            <a:normAutofit/>
+          </a:bodyPr>
+          <a:lstStyle/>
+          <a:p>
+            <a:pPr marL="457200" lvl="1" indent="0">
+              <a:buNone/>
+            </a:pPr>
+            <a:endParaRPr lang="en-US" sz="4000" dirty="0"/>
+          </a:p>
+          <a:p>
+            <a:endParaRPr lang="en-US" sz="4000" dirty="0"/>
+          </a:p>
+        </p:txBody>
+      </p:sp>
+      <p:pic>
+        <p:nvPicPr>
+          <p:cNvPr id="4" name="Picture 4">
+            <a:extLst>
+              <a:ext uri="{FF2B5EF4-FFF2-40B4-BE49-F238E27FC236}">
+                <a16:creationId xmlns:a16="http://schemas.microsoft.com/office/drawing/2014/main" id="{FFFED935-CFCF-476D-10AF-FD0069CFA9F5}"/>
+              </a:ext>
+            </a:extLst>
+          </p:cNvPr>
+          <p:cNvPicPr>
+            <a:picLocks noChangeAspect="1"/>
+          </p:cNvPicPr>
+          <p:nvPr/>
+        </p:nvPicPr>
+        <p:blipFill>
+          <a:blip r:embed="rId3"/>
+          <a:srcRect r="6038"/>
+          <a:stretch>
+            <a:fillRect/>
+          </a:stretch>
+        </p:blipFill>
+        <p:spPr>
+          <a:xfrm>
+            <a:off x="8813800" y="6465903"/>
+            <a:ext cx="2019193" cy="256630"/>
+          </a:xfrm>
+          <a:prstGeom prst="rect">
+            <a:avLst/>
+          </a:prstGeom>
+        </p:spPr>
+      </p:pic>
+      <p:pic>
+        <p:nvPicPr>
+          <p:cNvPr id="7" name="Picture 6">
+            <a:extLst>
+              <a:ext uri="{FF2B5EF4-FFF2-40B4-BE49-F238E27FC236}">
+                <a16:creationId xmlns:a16="http://schemas.microsoft.com/office/drawing/2014/main" id="{19AA641E-DEB6-7DA5-B7E9-FAD08721DACD}"/>
+              </a:ext>
+            </a:extLst>
+          </p:cNvPr>
+          <p:cNvPicPr>
+            <a:picLocks noChangeAspect="1"/>
+          </p:cNvPicPr>
+          <p:nvPr/>
+        </p:nvPicPr>
+        <p:blipFill>
+          <a:blip r:embed="rId4"/>
+          <a:stretch>
+            <a:fillRect/>
+          </a:stretch>
+        </p:blipFill>
+        <p:spPr>
+          <a:xfrm>
+            <a:off x="369836" y="1641274"/>
+            <a:ext cx="8335885" cy="4253917"/>
+          </a:xfrm>
+          <a:prstGeom prst="rect">
+            <a:avLst/>
+          </a:prstGeom>
+        </p:spPr>
+      </p:pic>
+    </p:spTree>
+    <p:extLst>
+      <p:ext uri="{BB962C8B-B14F-4D97-AF65-F5344CB8AC3E}">
+        <p14:creationId xmlns:p14="http://schemas.microsoft.com/office/powerpoint/2010/main" val="1579271032"/>
+      </p:ext>
+    </p:extLst>
+  </p:cSld>
+  <p:clrMapOvr>
+    <a:masterClrMapping/>
+  </p:clrMapOvr>
+</p:sld>
+</file>
+
+<file path=ppt/slides/slide11.xml><?xml version="1.0" encoding="utf-8"?>
+<p:sld xmlns:a="http://schemas.openxmlformats.org/drawingml/2006/main" xmlns:r="http://schemas.openxmlformats.org/officeDocument/2006/relationships" xmlns:p="http://schemas.openxmlformats.org/presentationml/2006/main">
+  <p:cSld>
+    <p:spTree>
+      <p:nvGrpSpPr>
+        <p:cNvPr id="1" name=""/>
+        <p:cNvGrpSpPr/>
+        <p:nvPr/>
+      </p:nvGrpSpPr>
+      <p:grpSpPr>
+        <a:xfrm>
+          <a:off x="0" y="0"/>
+          <a:ext cx="0" cy="0"/>
+          <a:chOff x="0" y="0"/>
+          <a:chExt cx="0" cy="0"/>
+        </a:xfrm>
+      </p:grpSpPr>
+      <p:sp>
+        <p:nvSpPr>
+          <p:cNvPr id="2" name="Rounded Rectangle 1">
+            <a:extLst>
+              <a:ext uri="{FF2B5EF4-FFF2-40B4-BE49-F238E27FC236}">
+                <a16:creationId xmlns:a16="http://schemas.microsoft.com/office/drawing/2014/main" id="{645F7801-ECAB-89B3-A95F-EF0AB4E073F0}"/>
+              </a:ext>
+            </a:extLst>
+          </p:cNvPr>
+          <p:cNvSpPr/>
+          <p:nvPr/>
+        </p:nvSpPr>
+        <p:spPr>
+          <a:xfrm>
+            <a:off x="3991087" y="1420009"/>
+            <a:ext cx="2194560" cy="1473571"/>
+          </a:xfrm>
+          <a:prstGeom prst="roundRect">
+            <a:avLst/>
+          </a:prstGeom>
+          <a:solidFill>
+            <a:srgbClr val="FFFF00"/>
+          </a:solidFill>
+        </p:spPr>
+        <p:style>
+          <a:lnRef idx="2">
+            <a:schemeClr val="accent1">
+              <a:shade val="50000"/>
+            </a:schemeClr>
+          </a:lnRef>
+          <a:fillRef idx="1">
+            <a:schemeClr val="accent1"/>
+          </a:fillRef>
+          <a:effectRef idx="0">
+            <a:schemeClr val="accent1"/>
+          </a:effectRef>
+          <a:fontRef idx="minor">
+            <a:schemeClr val="lt1"/>
+          </a:fontRef>
+        </p:style>
+        <p:txBody>
+          <a:bodyPr rtlCol="0" anchor="ctr"/>
+          <a:lstStyle/>
+          <a:p>
+            <a:pPr algn="ctr"/>
+            <a:endParaRPr lang="en-US"/>
+          </a:p>
+        </p:txBody>
+      </p:sp>
+      <p:sp>
+        <p:nvSpPr>
           <p:cNvPr id="38" name="Rectangle 37">
             <a:extLst>
               <a:ext uri="{FF2B5EF4-FFF2-40B4-BE49-F238E27FC236}">
@@ -13986,8 +14320,8 @@
         </p:blipFill>
         <p:spPr>
           <a:xfrm>
-            <a:off x="4286268" y="1687140"/>
-            <a:ext cx="1041399" cy="1009649"/>
+            <a:off x="4774561" y="2227085"/>
+            <a:ext cx="603901" cy="585489"/>
           </a:xfrm>
           <a:prstGeom prst="rect">
             <a:avLst/>
@@ -14392,6 +14726,59 @@
           </a:p>
         </p:txBody>
       </p:sp>
+      <p:sp>
+        <p:nvSpPr>
+          <p:cNvPr id="3" name="TextBox 2">
+            <a:extLst>
+              <a:ext uri="{FF2B5EF4-FFF2-40B4-BE49-F238E27FC236}">
+                <a16:creationId xmlns:a16="http://schemas.microsoft.com/office/drawing/2014/main" id="{E9CC3A73-4DA8-542F-3327-D76F972B3876}"/>
+              </a:ext>
+            </a:extLst>
+          </p:cNvPr>
+          <p:cNvSpPr txBox="1"/>
+          <p:nvPr/>
+        </p:nvSpPr>
+        <p:spPr>
+          <a:xfrm>
+            <a:off x="4127871" y="1519199"/>
+            <a:ext cx="1928903" cy="707886"/>
+          </a:xfrm>
+          <a:prstGeom prst="rect">
+            <a:avLst/>
+          </a:prstGeom>
+          <a:noFill/>
+        </p:spPr>
+        <p:txBody>
+          <a:bodyPr wrap="square" rtlCol="0">
+            <a:spAutoFit/>
+          </a:bodyPr>
+          <a:lstStyle/>
+          <a:p>
+            <a:pPr algn="ctr"/>
+            <a:r>
+              <a:rPr lang="en-US" sz="2000" dirty="0">
+                <a:solidFill>
+                  <a:schemeClr val="bg1"/>
+                </a:solidFill>
+              </a:rPr>
+              <a:t>Vanilla </a:t>
+            </a:r>
+            <a:r>
+              <a:rPr lang="en-US" sz="2000" dirty="0" err="1">
+                <a:solidFill>
+                  <a:schemeClr val="bg1"/>
+                </a:solidFill>
+              </a:rPr>
+              <a:t>SoftwareProcess</a:t>
+            </a:r>
+            <a:endParaRPr lang="en-US" sz="2000" dirty="0">
+              <a:solidFill>
+                <a:schemeClr val="bg1"/>
+              </a:solidFill>
+            </a:endParaRPr>
+          </a:p>
+        </p:txBody>
+      </p:sp>
     </p:spTree>
     <p:extLst>
       <p:ext uri="{BB962C8B-B14F-4D97-AF65-F5344CB8AC3E}">
@@ -14405,7 +14792,7 @@
 </p:sld>
 </file>
 
-<file path=ppt/slides/slide11.xml><?xml version="1.0" encoding="utf-8"?>
+<file path=ppt/slides/slide12.xml><?xml version="1.0" encoding="utf-8"?>
 <p:sld xmlns:a="http://schemas.openxmlformats.org/drawingml/2006/main" xmlns:r="http://schemas.openxmlformats.org/officeDocument/2006/relationships" xmlns:p="http://schemas.openxmlformats.org/presentationml/2006/main">
   <p:cSld>
     <p:spTree>
@@ -14568,7 +14955,7 @@
 </p:sld>
 </file>
 
-<file path=ppt/slides/slide12.xml><?xml version="1.0" encoding="utf-8"?>
+<file path=ppt/slides/slide13.xml><?xml version="1.0" encoding="utf-8"?>
 <p:sld xmlns:a="http://schemas.openxmlformats.org/drawingml/2006/main" xmlns:r="http://schemas.openxmlformats.org/officeDocument/2006/relationships" xmlns:p="http://schemas.openxmlformats.org/presentationml/2006/main">
   <p:cSld>
     <p:spTree>
@@ -14711,7 +15098,7 @@
 </p:sld>
 </file>
 
-<file path=ppt/slides/slide13.xml><?xml version="1.0" encoding="utf-8"?>
+<file path=ppt/slides/slide14.xml><?xml version="1.0" encoding="utf-8"?>
 <p:sld xmlns:a="http://schemas.openxmlformats.org/drawingml/2006/main" xmlns:r="http://schemas.openxmlformats.org/officeDocument/2006/relationships" xmlns:p="http://schemas.openxmlformats.org/presentationml/2006/main">
   <p:cSld>
     <p:spTree>
@@ -14783,12 +15170,12 @@
         <p:spPr>
           <a:xfrm>
             <a:off x="457200" y="2096713"/>
-            <a:ext cx="6082145" cy="4080250"/>
+            <a:ext cx="6707393" cy="4080250"/>
           </a:xfrm>
         </p:spPr>
         <p:txBody>
           <a:bodyPr>
-            <a:normAutofit lnSpcReduction="10000"/>
+            <a:normAutofit/>
           </a:bodyPr>
           <a:lstStyle/>
           <a:p>
@@ -15138,7 +15525,7 @@
 </p:sld>
 </file>
 
-<file path=ppt/slides/slide14.xml><?xml version="1.0" encoding="utf-8"?>
+<file path=ppt/slides/slide15.xml><?xml version="1.0" encoding="utf-8"?>
 <p:sld xmlns:a="http://schemas.openxmlformats.org/drawingml/2006/main" xmlns:r="http://schemas.openxmlformats.org/officeDocument/2006/relationships" xmlns:p="http://schemas.openxmlformats.org/presentationml/2006/main">
   <p:cSld>
     <p:bg>
@@ -16339,7 +16726,7 @@
 </p:sld>
 </file>
 
-<file path=ppt/slides/slide15.xml><?xml version="1.0" encoding="utf-8"?>
+<file path=ppt/slides/slide16.xml><?xml version="1.0" encoding="utf-8"?>
 <p:sld xmlns:a="http://schemas.openxmlformats.org/drawingml/2006/main" xmlns:r="http://schemas.openxmlformats.org/officeDocument/2006/relationships" xmlns:p="http://schemas.openxmlformats.org/presentationml/2006/main">
   <p:cSld>
     <p:bg>
@@ -17347,7 +17734,7 @@
 </p:sld>
 </file>
 
-<file path=ppt/slides/slide16.xml><?xml version="1.0" encoding="utf-8"?>
+<file path=ppt/slides/slide17.xml><?xml version="1.0" encoding="utf-8"?>
 <p:sld xmlns:a="http://schemas.openxmlformats.org/drawingml/2006/main" xmlns:r="http://schemas.openxmlformats.org/officeDocument/2006/relationships" xmlns:p="http://schemas.openxmlformats.org/presentationml/2006/main">
   <p:cSld>
     <p:spTree>
@@ -17720,7 +18107,9 @@
           </a:xfrm>
         </p:spPr>
         <p:txBody>
-          <a:bodyPr/>
+          <a:bodyPr>
+            <a:normAutofit/>
+          </a:bodyPr>
           <a:lstStyle/>
           <a:p>
             <a:r>
@@ -17783,12 +18172,6 @@
           <a:p>
             <a:r>
               <a:rPr lang="en-US" sz="4000" dirty="0"/>
-              <a:t>Apache Committer </a:t>
-            </a:r>
-          </a:p>
-          <a:p>
-            <a:r>
-              <a:rPr lang="en-US" sz="4000" dirty="0"/>
               <a:t>Technical Author for </a:t>
             </a:r>
             <a:r>
@@ -17796,6 +18179,12 @@
               <a:t>Apress</a:t>
             </a:r>
             <a:endParaRPr lang="en-US" sz="4000" dirty="0"/>
+          </a:p>
+          <a:p>
+            <a:r>
+              <a:rPr lang="en-US" sz="4000" dirty="0"/>
+              <a:t>Apache Committer </a:t>
+            </a:r>
           </a:p>
           <a:p>
             <a:r>
@@ -19189,7 +19578,7 @@
         </p:blipFill>
         <p:spPr>
           <a:xfrm>
-            <a:off x="4836669" y="2885332"/>
+            <a:off x="4910280" y="2274199"/>
             <a:ext cx="954976" cy="940829"/>
           </a:xfrm>
           <a:prstGeom prst="rect">
@@ -19219,7 +19608,7 @@
         </p:blipFill>
         <p:spPr>
           <a:xfrm>
-            <a:off x="4958458" y="5406916"/>
+            <a:off x="4947999" y="5719566"/>
             <a:ext cx="732314" cy="704148"/>
           </a:xfrm>
           <a:prstGeom prst="rect">
@@ -19249,7 +19638,7 @@
         </p:blipFill>
         <p:spPr>
           <a:xfrm>
-            <a:off x="4958457" y="3826161"/>
+            <a:off x="4980676" y="3623855"/>
             <a:ext cx="732315" cy="650296"/>
           </a:xfrm>
           <a:prstGeom prst="rect">
@@ -19425,6 +19814,151 @@
           <a:p>
             <a:pPr algn="ctr"/>
             <a:endParaRPr lang="en-US"/>
+          </a:p>
+        </p:txBody>
+      </p:sp>
+      <p:sp>
+        <p:nvSpPr>
+          <p:cNvPr id="3" name="TextBox 2">
+            <a:extLst>
+              <a:ext uri="{FF2B5EF4-FFF2-40B4-BE49-F238E27FC236}">
+                <a16:creationId xmlns:a16="http://schemas.microsoft.com/office/drawing/2014/main" id="{D28081EF-F433-30F5-C4F9-170EEAB86A13}"/>
+              </a:ext>
+            </a:extLst>
+          </p:cNvPr>
+          <p:cNvSpPr txBox="1"/>
+          <p:nvPr/>
+        </p:nvSpPr>
+        <p:spPr>
+          <a:xfrm>
+            <a:off x="4295101" y="5377274"/>
+            <a:ext cx="2038110" cy="461665"/>
+          </a:xfrm>
+          <a:prstGeom prst="rect">
+            <a:avLst/>
+          </a:prstGeom>
+          <a:noFill/>
+        </p:spPr>
+        <p:txBody>
+          <a:bodyPr wrap="square" rtlCol="0">
+            <a:spAutoFit/>
+          </a:bodyPr>
+          <a:lstStyle/>
+          <a:p>
+            <a:pPr algn="ctr"/>
+            <a:r>
+              <a:rPr lang="en-US" sz="2400" dirty="0"/>
+              <a:t>Terraform</a:t>
+            </a:r>
+          </a:p>
+        </p:txBody>
+      </p:sp>
+      <p:sp>
+        <p:nvSpPr>
+          <p:cNvPr id="4" name="TextBox 3">
+            <a:extLst>
+              <a:ext uri="{FF2B5EF4-FFF2-40B4-BE49-F238E27FC236}">
+                <a16:creationId xmlns:a16="http://schemas.microsoft.com/office/drawing/2014/main" id="{DBEEDD83-573F-0E4C-5CD7-A8D0048460E4}"/>
+              </a:ext>
+            </a:extLst>
+          </p:cNvPr>
+          <p:cNvSpPr txBox="1"/>
+          <p:nvPr/>
+        </p:nvSpPr>
+        <p:spPr>
+          <a:xfrm>
+            <a:off x="4327779" y="6242166"/>
+            <a:ext cx="2038110" cy="461665"/>
+          </a:xfrm>
+          <a:prstGeom prst="rect">
+            <a:avLst/>
+          </a:prstGeom>
+          <a:noFill/>
+        </p:spPr>
+        <p:txBody>
+          <a:bodyPr wrap="square" rtlCol="0">
+            <a:spAutoFit/>
+          </a:bodyPr>
+          <a:lstStyle/>
+          <a:p>
+            <a:pPr algn="ctr"/>
+            <a:r>
+              <a:rPr lang="en-US" sz="2400" dirty="0" err="1"/>
+              <a:t>Pulumi</a:t>
+            </a:r>
+            <a:endParaRPr lang="en-US" sz="2400" dirty="0"/>
+          </a:p>
+        </p:txBody>
+      </p:sp>
+      <p:sp>
+        <p:nvSpPr>
+          <p:cNvPr id="11" name="TextBox 10">
+            <a:extLst>
+              <a:ext uri="{FF2B5EF4-FFF2-40B4-BE49-F238E27FC236}">
+                <a16:creationId xmlns:a16="http://schemas.microsoft.com/office/drawing/2014/main" id="{94EB453A-F2C6-812C-57BB-3264538A76E5}"/>
+              </a:ext>
+            </a:extLst>
+          </p:cNvPr>
+          <p:cNvSpPr txBox="1"/>
+          <p:nvPr/>
+        </p:nvSpPr>
+        <p:spPr>
+          <a:xfrm>
+            <a:off x="3848208" y="3143769"/>
+            <a:ext cx="3058605" cy="461665"/>
+          </a:xfrm>
+          <a:prstGeom prst="rect">
+            <a:avLst/>
+          </a:prstGeom>
+          <a:noFill/>
+        </p:spPr>
+        <p:txBody>
+          <a:bodyPr wrap="square" rtlCol="0">
+            <a:spAutoFit/>
+          </a:bodyPr>
+          <a:lstStyle/>
+          <a:p>
+            <a:pPr algn="ctr"/>
+            <a:r>
+              <a:rPr lang="en-US" sz="2400" dirty="0"/>
+              <a:t>CloudFormation</a:t>
+            </a:r>
+          </a:p>
+        </p:txBody>
+      </p:sp>
+      <p:sp>
+        <p:nvSpPr>
+          <p:cNvPr id="16" name="TextBox 15">
+            <a:extLst>
+              <a:ext uri="{FF2B5EF4-FFF2-40B4-BE49-F238E27FC236}">
+                <a16:creationId xmlns:a16="http://schemas.microsoft.com/office/drawing/2014/main" id="{2D319E91-DB90-FF56-1C73-F8B275785CA0}"/>
+              </a:ext>
+            </a:extLst>
+          </p:cNvPr>
+          <p:cNvSpPr txBox="1"/>
+          <p:nvPr/>
+        </p:nvSpPr>
+        <p:spPr>
+          <a:xfrm>
+            <a:off x="4151010" y="4244171"/>
+            <a:ext cx="3058605" cy="461665"/>
+          </a:xfrm>
+          <a:prstGeom prst="rect">
+            <a:avLst/>
+          </a:prstGeom>
+          <a:noFill/>
+        </p:spPr>
+        <p:txBody>
+          <a:bodyPr wrap="square" rtlCol="0">
+            <a:spAutoFit/>
+          </a:bodyPr>
+          <a:lstStyle/>
+          <a:p>
+            <a:pPr algn="ctr"/>
+            <a:r>
+              <a:rPr lang="en-US" sz="2400" dirty="0"/>
+              <a:t>Deployment Manager</a:t>
+            </a:r>
           </a:p>
         </p:txBody>
       </p:sp>

</xml_diff>